<commit_message>
fullstack renamed to FULLSTACK
this is the master for multi-level editing
</commit_message>
<xml_diff>
--- a/lernOS Canvas/de/Canvas-Carnival_kpe.pptx
+++ b/lernOS Canvas/de/Canvas-Carnival_kpe.pptx
@@ -2,7 +2,7 @@
 <file path=ppt/presentation.xml><?xml version="1.0" encoding="utf-8"?>
 <p:presentation xmlns:a="http://schemas.openxmlformats.org/drawingml/2006/main" xmlns:r="http://schemas.openxmlformats.org/officeDocument/2006/relationships" xmlns:p="http://schemas.openxmlformats.org/presentationml/2006/main" saveSubsetFonts="1">
   <p:sldMasterIdLst>
-    <p:sldMasterId id="2147483648" r:id="rId1"/>
+    <p:sldMasterId id="2147483660" r:id="rId1"/>
   </p:sldMasterIdLst>
   <p:sldIdLst>
     <p:sldId id="260" r:id="rId2"/>
@@ -15,13 +15,13 @@
     <p:sldId id="261" r:id="rId9"/>
     <p:sldId id="263" r:id="rId10"/>
   </p:sldIdLst>
-  <p:sldSz cx="12192000" cy="6858000"/>
+  <p:sldSz cx="10799763" cy="10799763"/>
   <p:notesSz cx="6858000" cy="9144000"/>
   <p:defaultTextStyle>
     <a:defPPr>
       <a:defRPr lang="en-US"/>
     </a:defPPr>
-    <a:lvl1pPr marL="0" algn="l" defTabSz="914400" rtl="0" eaLnBrk="1" latinLnBrk="0" hangingPunct="1">
+    <a:lvl1pPr marL="0" algn="l" defTabSz="457200" rtl="0" eaLnBrk="1" latinLnBrk="0" hangingPunct="1">
       <a:defRPr sz="1800" kern="1200">
         <a:solidFill>
           <a:schemeClr val="tx1"/>
@@ -31,7 +31,7 @@
         <a:cs typeface="+mn-cs"/>
       </a:defRPr>
     </a:lvl1pPr>
-    <a:lvl2pPr marL="457200" algn="l" defTabSz="914400" rtl="0" eaLnBrk="1" latinLnBrk="0" hangingPunct="1">
+    <a:lvl2pPr marL="457200" algn="l" defTabSz="457200" rtl="0" eaLnBrk="1" latinLnBrk="0" hangingPunct="1">
       <a:defRPr sz="1800" kern="1200">
         <a:solidFill>
           <a:schemeClr val="tx1"/>
@@ -41,7 +41,7 @@
         <a:cs typeface="+mn-cs"/>
       </a:defRPr>
     </a:lvl2pPr>
-    <a:lvl3pPr marL="914400" algn="l" defTabSz="914400" rtl="0" eaLnBrk="1" latinLnBrk="0" hangingPunct="1">
+    <a:lvl3pPr marL="914400" algn="l" defTabSz="457200" rtl="0" eaLnBrk="1" latinLnBrk="0" hangingPunct="1">
       <a:defRPr sz="1800" kern="1200">
         <a:solidFill>
           <a:schemeClr val="tx1"/>
@@ -51,7 +51,7 @@
         <a:cs typeface="+mn-cs"/>
       </a:defRPr>
     </a:lvl3pPr>
-    <a:lvl4pPr marL="1371600" algn="l" defTabSz="914400" rtl="0" eaLnBrk="1" latinLnBrk="0" hangingPunct="1">
+    <a:lvl4pPr marL="1371600" algn="l" defTabSz="457200" rtl="0" eaLnBrk="1" latinLnBrk="0" hangingPunct="1">
       <a:defRPr sz="1800" kern="1200">
         <a:solidFill>
           <a:schemeClr val="tx1"/>
@@ -61,7 +61,7 @@
         <a:cs typeface="+mn-cs"/>
       </a:defRPr>
     </a:lvl4pPr>
-    <a:lvl5pPr marL="1828800" algn="l" defTabSz="914400" rtl="0" eaLnBrk="1" latinLnBrk="0" hangingPunct="1">
+    <a:lvl5pPr marL="1828800" algn="l" defTabSz="457200" rtl="0" eaLnBrk="1" latinLnBrk="0" hangingPunct="1">
       <a:defRPr sz="1800" kern="1200">
         <a:solidFill>
           <a:schemeClr val="tx1"/>
@@ -71,7 +71,7 @@
         <a:cs typeface="+mn-cs"/>
       </a:defRPr>
     </a:lvl5pPr>
-    <a:lvl6pPr marL="2286000" algn="l" defTabSz="914400" rtl="0" eaLnBrk="1" latinLnBrk="0" hangingPunct="1">
+    <a:lvl6pPr marL="2286000" algn="l" defTabSz="457200" rtl="0" eaLnBrk="1" latinLnBrk="0" hangingPunct="1">
       <a:defRPr sz="1800" kern="1200">
         <a:solidFill>
           <a:schemeClr val="tx1"/>
@@ -81,7 +81,7 @@
         <a:cs typeface="+mn-cs"/>
       </a:defRPr>
     </a:lvl6pPr>
-    <a:lvl7pPr marL="2743200" algn="l" defTabSz="914400" rtl="0" eaLnBrk="1" latinLnBrk="0" hangingPunct="1">
+    <a:lvl7pPr marL="2743200" algn="l" defTabSz="457200" rtl="0" eaLnBrk="1" latinLnBrk="0" hangingPunct="1">
       <a:defRPr sz="1800" kern="1200">
         <a:solidFill>
           <a:schemeClr val="tx1"/>
@@ -91,7 +91,7 @@
         <a:cs typeface="+mn-cs"/>
       </a:defRPr>
     </a:lvl7pPr>
-    <a:lvl8pPr marL="3200400" algn="l" defTabSz="914400" rtl="0" eaLnBrk="1" latinLnBrk="0" hangingPunct="1">
+    <a:lvl8pPr marL="3200400" algn="l" defTabSz="457200" rtl="0" eaLnBrk="1" latinLnBrk="0" hangingPunct="1">
       <a:defRPr sz="1800" kern="1200">
         <a:solidFill>
           <a:schemeClr val="tx1"/>
@@ -101,7 +101,7 @@
         <a:cs typeface="+mn-cs"/>
       </a:defRPr>
     </a:lvl8pPr>
-    <a:lvl9pPr marL="3657600" algn="l" defTabSz="914400" rtl="0" eaLnBrk="1" latinLnBrk="0" hangingPunct="1">
+    <a:lvl9pPr marL="3657600" algn="l" defTabSz="457200" rtl="0" eaLnBrk="1" latinLnBrk="0" hangingPunct="1">
       <a:defRPr sz="1800" kern="1200">
         <a:solidFill>
           <a:schemeClr val="tx1"/>
@@ -139,13 +139,7 @@
       </p:grpSpPr>
       <p:sp>
         <p:nvSpPr>
-          <p:cNvPr id="2" name="Title 1">
-            <a:extLst>
-              <a:ext uri="{FF2B5EF4-FFF2-40B4-BE49-F238E27FC236}">
-                <a16:creationId xmlns:a16="http://schemas.microsoft.com/office/drawing/2014/main" id="{491B1F3E-1E3E-4596-B34F-F8F198D2D505}"/>
-              </a:ext>
-            </a:extLst>
-          </p:cNvPr>
+          <p:cNvPr id="2" name="Title 1"/>
           <p:cNvSpPr>
             <a:spLocks noGrp="1"/>
           </p:cNvSpPr>
@@ -155,15 +149,15 @@
         </p:nvSpPr>
         <p:spPr>
           <a:xfrm>
-            <a:off x="1524000" y="1122363"/>
-            <a:ext cx="9144000" cy="2387600"/>
+            <a:off x="809982" y="1767462"/>
+            <a:ext cx="9179799" cy="3759917"/>
           </a:xfrm>
         </p:spPr>
         <p:txBody>
           <a:bodyPr anchor="b"/>
           <a:lstStyle>
             <a:lvl1pPr algn="ctr">
-              <a:defRPr sz="6000"/>
+              <a:defRPr sz="7087"/>
             </a:lvl1pPr>
           </a:lstStyle>
           <a:p>
@@ -171,18 +165,13 @@
               <a:rPr lang="en-US"/>
               <a:t>Click to edit Master title style</a:t>
             </a:r>
-          </a:p>
-        </p:txBody>
-      </p:sp>
-      <p:sp>
-        <p:nvSpPr>
-          <p:cNvPr id="3" name="Subtitle 2">
-            <a:extLst>
-              <a:ext uri="{FF2B5EF4-FFF2-40B4-BE49-F238E27FC236}">
-                <a16:creationId xmlns:a16="http://schemas.microsoft.com/office/drawing/2014/main" id="{89B119FD-8F0A-4E06-856E-5CB1DE01F187}"/>
-              </a:ext>
-            </a:extLst>
-          </p:cNvPr>
+            <a:endParaRPr lang="en-US" dirty="0"/>
+          </a:p>
+        </p:txBody>
+      </p:sp>
+      <p:sp>
+        <p:nvSpPr>
+          <p:cNvPr id="3" name="Subtitle 2"/>
           <p:cNvSpPr>
             <a:spLocks noGrp="1"/>
           </p:cNvSpPr>
@@ -192,8 +181,8 @@
         </p:nvSpPr>
         <p:spPr>
           <a:xfrm>
-            <a:off x="1524000" y="3602038"/>
-            <a:ext cx="9144000" cy="1655762"/>
+            <a:off x="1349971" y="5672376"/>
+            <a:ext cx="8099822" cy="2607442"/>
           </a:xfrm>
         </p:spPr>
         <p:txBody>
@@ -201,39 +190,39 @@
           <a:lstStyle>
             <a:lvl1pPr marL="0" indent="0" algn="ctr">
               <a:buNone/>
-              <a:defRPr sz="2400"/>
+              <a:defRPr sz="2835"/>
             </a:lvl1pPr>
-            <a:lvl2pPr marL="457200" indent="0" algn="ctr">
-              <a:buNone/>
-              <a:defRPr sz="2000"/>
+            <a:lvl2pPr marL="539999" indent="0" algn="ctr">
+              <a:buNone/>
+              <a:defRPr sz="2362"/>
             </a:lvl2pPr>
-            <a:lvl3pPr marL="914400" indent="0" algn="ctr">
-              <a:buNone/>
-              <a:defRPr sz="1800"/>
+            <a:lvl3pPr marL="1079998" indent="0" algn="ctr">
+              <a:buNone/>
+              <a:defRPr sz="2126"/>
             </a:lvl3pPr>
-            <a:lvl4pPr marL="1371600" indent="0" algn="ctr">
-              <a:buNone/>
-              <a:defRPr sz="1600"/>
+            <a:lvl4pPr marL="1619997" indent="0" algn="ctr">
+              <a:buNone/>
+              <a:defRPr sz="1890"/>
             </a:lvl4pPr>
-            <a:lvl5pPr marL="1828800" indent="0" algn="ctr">
-              <a:buNone/>
-              <a:defRPr sz="1600"/>
+            <a:lvl5pPr marL="2159996" indent="0" algn="ctr">
+              <a:buNone/>
+              <a:defRPr sz="1890"/>
             </a:lvl5pPr>
-            <a:lvl6pPr marL="2286000" indent="0" algn="ctr">
-              <a:buNone/>
-              <a:defRPr sz="1600"/>
+            <a:lvl6pPr marL="2699995" indent="0" algn="ctr">
+              <a:buNone/>
+              <a:defRPr sz="1890"/>
             </a:lvl6pPr>
-            <a:lvl7pPr marL="2743200" indent="0" algn="ctr">
-              <a:buNone/>
-              <a:defRPr sz="1600"/>
+            <a:lvl7pPr marL="3239994" indent="0" algn="ctr">
+              <a:buNone/>
+              <a:defRPr sz="1890"/>
             </a:lvl7pPr>
-            <a:lvl8pPr marL="3200400" indent="0" algn="ctr">
-              <a:buNone/>
-              <a:defRPr sz="1600"/>
+            <a:lvl8pPr marL="3779992" indent="0" algn="ctr">
+              <a:buNone/>
+              <a:defRPr sz="1890"/>
             </a:lvl8pPr>
-            <a:lvl9pPr marL="3657600" indent="0" algn="ctr">
-              <a:buNone/>
-              <a:defRPr sz="1600"/>
+            <a:lvl9pPr marL="4319991" indent="0" algn="ctr">
+              <a:buNone/>
+              <a:defRPr sz="1890"/>
             </a:lvl9pPr>
           </a:lstStyle>
           <a:p>
@@ -241,18 +230,13 @@
               <a:rPr lang="en-US"/>
               <a:t>Click to edit Master subtitle style</a:t>
             </a:r>
-          </a:p>
-        </p:txBody>
-      </p:sp>
-      <p:sp>
-        <p:nvSpPr>
-          <p:cNvPr id="4" name="Date Placeholder 3">
-            <a:extLst>
-              <a:ext uri="{FF2B5EF4-FFF2-40B4-BE49-F238E27FC236}">
-                <a16:creationId xmlns:a16="http://schemas.microsoft.com/office/drawing/2014/main" id="{8C30ABE0-EEAE-4EAA-BE6D-56539A61FF11}"/>
-              </a:ext>
-            </a:extLst>
-          </p:cNvPr>
+            <a:endParaRPr lang="en-US" dirty="0"/>
+          </a:p>
+        </p:txBody>
+      </p:sp>
+      <p:sp>
+        <p:nvSpPr>
+          <p:cNvPr id="4" name="Date Placeholder 3"/>
           <p:cNvSpPr>
             <a:spLocks noGrp="1"/>
           </p:cNvSpPr>
@@ -267,7 +251,7 @@
           <a:p>
             <a:fld id="{2F0D3B1E-FCC1-4A5E-9AAF-BCC374D20566}" type="datetimeFigureOut">
               <a:rPr lang="en-US" smtClean="0"/>
-              <a:t>2021-03-05</a:t>
+              <a:t>2021-06-10</a:t>
             </a:fld>
             <a:endParaRPr lang="en-US"/>
           </a:p>
@@ -275,13 +259,7 @@
       </p:sp>
       <p:sp>
         <p:nvSpPr>
-          <p:cNvPr id="5" name="Footer Placeholder 4">
-            <a:extLst>
-              <a:ext uri="{FF2B5EF4-FFF2-40B4-BE49-F238E27FC236}">
-                <a16:creationId xmlns:a16="http://schemas.microsoft.com/office/drawing/2014/main" id="{A1F40EF4-2BBF-4E8C-97C8-4A0AD46EDC33}"/>
-              </a:ext>
-            </a:extLst>
-          </p:cNvPr>
+          <p:cNvPr id="5" name="Footer Placeholder 4"/>
           <p:cNvSpPr>
             <a:spLocks noGrp="1"/>
           </p:cNvSpPr>
@@ -300,13 +278,7 @@
       </p:sp>
       <p:sp>
         <p:nvSpPr>
-          <p:cNvPr id="6" name="Slide Number Placeholder 5">
-            <a:extLst>
-              <a:ext uri="{FF2B5EF4-FFF2-40B4-BE49-F238E27FC236}">
-                <a16:creationId xmlns:a16="http://schemas.microsoft.com/office/drawing/2014/main" id="{EB6D20D3-DDAB-431C-AB97-26258A1F99DC}"/>
-              </a:ext>
-            </a:extLst>
-          </p:cNvPr>
+          <p:cNvPr id="6" name="Slide Number Placeholder 5"/>
           <p:cNvSpPr>
             <a:spLocks noGrp="1"/>
           </p:cNvSpPr>
@@ -330,7 +302,7 @@
     </p:spTree>
     <p:extLst>
       <p:ext uri="{BB962C8B-B14F-4D97-AF65-F5344CB8AC3E}">
-        <p14:creationId xmlns:p14="http://schemas.microsoft.com/office/powerpoint/2010/main" val="3596737180"/>
+        <p14:creationId xmlns:p14="http://schemas.microsoft.com/office/powerpoint/2010/main" val="143814378"/>
       </p:ext>
     </p:extLst>
   </p:cSld>
@@ -359,13 +331,7 @@
       </p:grpSpPr>
       <p:sp>
         <p:nvSpPr>
-          <p:cNvPr id="2" name="Title 1">
-            <a:extLst>
-              <a:ext uri="{FF2B5EF4-FFF2-40B4-BE49-F238E27FC236}">
-                <a16:creationId xmlns:a16="http://schemas.microsoft.com/office/drawing/2014/main" id="{77B59A9F-A65F-4180-98E5-51E834569504}"/>
-              </a:ext>
-            </a:extLst>
-          </p:cNvPr>
+          <p:cNvPr id="2" name="Title 1"/>
           <p:cNvSpPr>
             <a:spLocks noGrp="1"/>
           </p:cNvSpPr>
@@ -382,18 +348,13 @@
               <a:rPr lang="en-US"/>
               <a:t>Click to edit Master title style</a:t>
             </a:r>
-          </a:p>
-        </p:txBody>
-      </p:sp>
-      <p:sp>
-        <p:nvSpPr>
-          <p:cNvPr id="3" name="Vertical Text Placeholder 2">
-            <a:extLst>
-              <a:ext uri="{FF2B5EF4-FFF2-40B4-BE49-F238E27FC236}">
-                <a16:creationId xmlns:a16="http://schemas.microsoft.com/office/drawing/2014/main" id="{FE84A333-36F7-4605-8308-ED569C17B442}"/>
-              </a:ext>
-            </a:extLst>
-          </p:cNvPr>
+            <a:endParaRPr lang="en-US" dirty="0"/>
+          </a:p>
+        </p:txBody>
+      </p:sp>
+      <p:sp>
+        <p:nvSpPr>
+          <p:cNvPr id="3" name="Vertical Text Placeholder 2"/>
           <p:cNvSpPr>
             <a:spLocks noGrp="1"/>
           </p:cNvSpPr>
@@ -439,18 +400,13 @@
               <a:rPr lang="en-US"/>
               <a:t>Fifth level</a:t>
             </a:r>
-          </a:p>
-        </p:txBody>
-      </p:sp>
-      <p:sp>
-        <p:nvSpPr>
-          <p:cNvPr id="4" name="Date Placeholder 3">
-            <a:extLst>
-              <a:ext uri="{FF2B5EF4-FFF2-40B4-BE49-F238E27FC236}">
-                <a16:creationId xmlns:a16="http://schemas.microsoft.com/office/drawing/2014/main" id="{F80AED88-4CEF-4574-9016-9CA75B41D449}"/>
-              </a:ext>
-            </a:extLst>
-          </p:cNvPr>
+            <a:endParaRPr lang="en-US" dirty="0"/>
+          </a:p>
+        </p:txBody>
+      </p:sp>
+      <p:sp>
+        <p:nvSpPr>
+          <p:cNvPr id="4" name="Date Placeholder 3"/>
           <p:cNvSpPr>
             <a:spLocks noGrp="1"/>
           </p:cNvSpPr>
@@ -465,7 +421,7 @@
           <a:p>
             <a:fld id="{2F0D3B1E-FCC1-4A5E-9AAF-BCC374D20566}" type="datetimeFigureOut">
               <a:rPr lang="en-US" smtClean="0"/>
-              <a:t>2021-03-05</a:t>
+              <a:t>2021-06-10</a:t>
             </a:fld>
             <a:endParaRPr lang="en-US"/>
           </a:p>
@@ -473,13 +429,7 @@
       </p:sp>
       <p:sp>
         <p:nvSpPr>
-          <p:cNvPr id="5" name="Footer Placeholder 4">
-            <a:extLst>
-              <a:ext uri="{FF2B5EF4-FFF2-40B4-BE49-F238E27FC236}">
-                <a16:creationId xmlns:a16="http://schemas.microsoft.com/office/drawing/2014/main" id="{14D7D100-6694-4932-B7AB-4459DB293664}"/>
-              </a:ext>
-            </a:extLst>
-          </p:cNvPr>
+          <p:cNvPr id="5" name="Footer Placeholder 4"/>
           <p:cNvSpPr>
             <a:spLocks noGrp="1"/>
           </p:cNvSpPr>
@@ -498,13 +448,7 @@
       </p:sp>
       <p:sp>
         <p:nvSpPr>
-          <p:cNvPr id="6" name="Slide Number Placeholder 5">
-            <a:extLst>
-              <a:ext uri="{FF2B5EF4-FFF2-40B4-BE49-F238E27FC236}">
-                <a16:creationId xmlns:a16="http://schemas.microsoft.com/office/drawing/2014/main" id="{4ECBCD4A-6E59-44F7-8390-709BF6BA2A68}"/>
-              </a:ext>
-            </a:extLst>
-          </p:cNvPr>
+          <p:cNvPr id="6" name="Slide Number Placeholder 5"/>
           <p:cNvSpPr>
             <a:spLocks noGrp="1"/>
           </p:cNvSpPr>
@@ -528,7 +472,7 @@
     </p:spTree>
     <p:extLst>
       <p:ext uri="{BB962C8B-B14F-4D97-AF65-F5344CB8AC3E}">
-        <p14:creationId xmlns:p14="http://schemas.microsoft.com/office/powerpoint/2010/main" val="2034455754"/>
+        <p14:creationId xmlns:p14="http://schemas.microsoft.com/office/powerpoint/2010/main" val="4193569579"/>
       </p:ext>
     </p:extLst>
   </p:cSld>
@@ -557,13 +501,7 @@
       </p:grpSpPr>
       <p:sp>
         <p:nvSpPr>
-          <p:cNvPr id="2" name="Vertical Title 1">
-            <a:extLst>
-              <a:ext uri="{FF2B5EF4-FFF2-40B4-BE49-F238E27FC236}">
-                <a16:creationId xmlns:a16="http://schemas.microsoft.com/office/drawing/2014/main" id="{CBA91896-3851-448F-B726-52AC6ED92E29}"/>
-              </a:ext>
-            </a:extLst>
-          </p:cNvPr>
+          <p:cNvPr id="2" name="Vertical Title 1"/>
           <p:cNvSpPr>
             <a:spLocks noGrp="1"/>
           </p:cNvSpPr>
@@ -573,8 +511,8 @@
         </p:nvSpPr>
         <p:spPr>
           <a:xfrm>
-            <a:off x="8724900" y="365125"/>
-            <a:ext cx="2628900" cy="5811838"/>
+            <a:off x="7728581" y="574987"/>
+            <a:ext cx="2328699" cy="9152300"/>
           </a:xfrm>
         </p:spPr>
         <p:txBody>
@@ -585,18 +523,13 @@
               <a:rPr lang="en-US"/>
               <a:t>Click to edit Master title style</a:t>
             </a:r>
-          </a:p>
-        </p:txBody>
-      </p:sp>
-      <p:sp>
-        <p:nvSpPr>
-          <p:cNvPr id="3" name="Vertical Text Placeholder 2">
-            <a:extLst>
-              <a:ext uri="{FF2B5EF4-FFF2-40B4-BE49-F238E27FC236}">
-                <a16:creationId xmlns:a16="http://schemas.microsoft.com/office/drawing/2014/main" id="{D3B8F6AD-BF3F-4486-BF87-AEA240406EBE}"/>
-              </a:ext>
-            </a:extLst>
-          </p:cNvPr>
+            <a:endParaRPr lang="en-US" dirty="0"/>
+          </a:p>
+        </p:txBody>
+      </p:sp>
+      <p:sp>
+        <p:nvSpPr>
+          <p:cNvPr id="3" name="Vertical Text Placeholder 2"/>
           <p:cNvSpPr>
             <a:spLocks noGrp="1"/>
           </p:cNvSpPr>
@@ -606,8 +539,8 @@
         </p:nvSpPr>
         <p:spPr>
           <a:xfrm>
-            <a:off x="838200" y="365125"/>
-            <a:ext cx="7734300" cy="5811838"/>
+            <a:off x="742484" y="574987"/>
+            <a:ext cx="6851100" cy="9152300"/>
           </a:xfrm>
         </p:spPr>
         <p:txBody>
@@ -647,18 +580,13 @@
               <a:rPr lang="en-US"/>
               <a:t>Fifth level</a:t>
             </a:r>
-          </a:p>
-        </p:txBody>
-      </p:sp>
-      <p:sp>
-        <p:nvSpPr>
-          <p:cNvPr id="4" name="Date Placeholder 3">
-            <a:extLst>
-              <a:ext uri="{FF2B5EF4-FFF2-40B4-BE49-F238E27FC236}">
-                <a16:creationId xmlns:a16="http://schemas.microsoft.com/office/drawing/2014/main" id="{8E6782EF-86CF-4668-A052-8338A95A717A}"/>
-              </a:ext>
-            </a:extLst>
-          </p:cNvPr>
+            <a:endParaRPr lang="en-US" dirty="0"/>
+          </a:p>
+        </p:txBody>
+      </p:sp>
+      <p:sp>
+        <p:nvSpPr>
+          <p:cNvPr id="4" name="Date Placeholder 3"/>
           <p:cNvSpPr>
             <a:spLocks noGrp="1"/>
           </p:cNvSpPr>
@@ -673,7 +601,7 @@
           <a:p>
             <a:fld id="{2F0D3B1E-FCC1-4A5E-9AAF-BCC374D20566}" type="datetimeFigureOut">
               <a:rPr lang="en-US" smtClean="0"/>
-              <a:t>2021-03-05</a:t>
+              <a:t>2021-06-10</a:t>
             </a:fld>
             <a:endParaRPr lang="en-US"/>
           </a:p>
@@ -681,13 +609,7 @@
       </p:sp>
       <p:sp>
         <p:nvSpPr>
-          <p:cNvPr id="5" name="Footer Placeholder 4">
-            <a:extLst>
-              <a:ext uri="{FF2B5EF4-FFF2-40B4-BE49-F238E27FC236}">
-                <a16:creationId xmlns:a16="http://schemas.microsoft.com/office/drawing/2014/main" id="{72173ABA-7987-4681-95A6-59527A2DD762}"/>
-              </a:ext>
-            </a:extLst>
-          </p:cNvPr>
+          <p:cNvPr id="5" name="Footer Placeholder 4"/>
           <p:cNvSpPr>
             <a:spLocks noGrp="1"/>
           </p:cNvSpPr>
@@ -706,13 +628,7 @@
       </p:sp>
       <p:sp>
         <p:nvSpPr>
-          <p:cNvPr id="6" name="Slide Number Placeholder 5">
-            <a:extLst>
-              <a:ext uri="{FF2B5EF4-FFF2-40B4-BE49-F238E27FC236}">
-                <a16:creationId xmlns:a16="http://schemas.microsoft.com/office/drawing/2014/main" id="{E88375A7-8AAD-4C74-9FF2-C03B5BF554C3}"/>
-              </a:ext>
-            </a:extLst>
-          </p:cNvPr>
+          <p:cNvPr id="6" name="Slide Number Placeholder 5"/>
           <p:cNvSpPr>
             <a:spLocks noGrp="1"/>
           </p:cNvSpPr>
@@ -736,7 +652,7 @@
     </p:spTree>
     <p:extLst>
       <p:ext uri="{BB962C8B-B14F-4D97-AF65-F5344CB8AC3E}">
-        <p14:creationId xmlns:p14="http://schemas.microsoft.com/office/powerpoint/2010/main" val="3413300005"/>
+        <p14:creationId xmlns:p14="http://schemas.microsoft.com/office/powerpoint/2010/main" val="4041134379"/>
       </p:ext>
     </p:extLst>
   </p:cSld>
@@ -765,13 +681,7 @@
       </p:grpSpPr>
       <p:sp>
         <p:nvSpPr>
-          <p:cNvPr id="2" name="Title 1">
-            <a:extLst>
-              <a:ext uri="{FF2B5EF4-FFF2-40B4-BE49-F238E27FC236}">
-                <a16:creationId xmlns:a16="http://schemas.microsoft.com/office/drawing/2014/main" id="{BBABD8BF-8C9C-4DF8-B64C-E2AC4B6BB5CF}"/>
-              </a:ext>
-            </a:extLst>
-          </p:cNvPr>
+          <p:cNvPr id="2" name="Title 1"/>
           <p:cNvSpPr>
             <a:spLocks noGrp="1"/>
           </p:cNvSpPr>
@@ -788,18 +698,13 @@
               <a:rPr lang="en-US"/>
               <a:t>Click to edit Master title style</a:t>
             </a:r>
-          </a:p>
-        </p:txBody>
-      </p:sp>
-      <p:sp>
-        <p:nvSpPr>
-          <p:cNvPr id="3" name="Content Placeholder 2">
-            <a:extLst>
-              <a:ext uri="{FF2B5EF4-FFF2-40B4-BE49-F238E27FC236}">
-                <a16:creationId xmlns:a16="http://schemas.microsoft.com/office/drawing/2014/main" id="{130093CD-5B9D-440D-A5E9-977B441B54B6}"/>
-              </a:ext>
-            </a:extLst>
-          </p:cNvPr>
+            <a:endParaRPr lang="en-US" dirty="0"/>
+          </a:p>
+        </p:txBody>
+      </p:sp>
+      <p:sp>
+        <p:nvSpPr>
+          <p:cNvPr id="3" name="Content Placeholder 2"/>
           <p:cNvSpPr>
             <a:spLocks noGrp="1"/>
           </p:cNvSpPr>
@@ -845,18 +750,13 @@
               <a:rPr lang="en-US"/>
               <a:t>Fifth level</a:t>
             </a:r>
-          </a:p>
-        </p:txBody>
-      </p:sp>
-      <p:sp>
-        <p:nvSpPr>
-          <p:cNvPr id="4" name="Date Placeholder 3">
-            <a:extLst>
-              <a:ext uri="{FF2B5EF4-FFF2-40B4-BE49-F238E27FC236}">
-                <a16:creationId xmlns:a16="http://schemas.microsoft.com/office/drawing/2014/main" id="{7143B35D-2C8B-44C8-AC3D-74B3F57E20E1}"/>
-              </a:ext>
-            </a:extLst>
-          </p:cNvPr>
+            <a:endParaRPr lang="en-US" dirty="0"/>
+          </a:p>
+        </p:txBody>
+      </p:sp>
+      <p:sp>
+        <p:nvSpPr>
+          <p:cNvPr id="4" name="Date Placeholder 3"/>
           <p:cNvSpPr>
             <a:spLocks noGrp="1"/>
           </p:cNvSpPr>
@@ -871,7 +771,7 @@
           <a:p>
             <a:fld id="{2F0D3B1E-FCC1-4A5E-9AAF-BCC374D20566}" type="datetimeFigureOut">
               <a:rPr lang="en-US" smtClean="0"/>
-              <a:t>2021-03-05</a:t>
+              <a:t>2021-06-10</a:t>
             </a:fld>
             <a:endParaRPr lang="en-US"/>
           </a:p>
@@ -879,13 +779,7 @@
       </p:sp>
       <p:sp>
         <p:nvSpPr>
-          <p:cNvPr id="5" name="Footer Placeholder 4">
-            <a:extLst>
-              <a:ext uri="{FF2B5EF4-FFF2-40B4-BE49-F238E27FC236}">
-                <a16:creationId xmlns:a16="http://schemas.microsoft.com/office/drawing/2014/main" id="{A1568777-0CEF-4B49-8A0D-FF1832DB031C}"/>
-              </a:ext>
-            </a:extLst>
-          </p:cNvPr>
+          <p:cNvPr id="5" name="Footer Placeholder 4"/>
           <p:cNvSpPr>
             <a:spLocks noGrp="1"/>
           </p:cNvSpPr>
@@ -904,13 +798,7 @@
       </p:sp>
       <p:sp>
         <p:nvSpPr>
-          <p:cNvPr id="6" name="Slide Number Placeholder 5">
-            <a:extLst>
-              <a:ext uri="{FF2B5EF4-FFF2-40B4-BE49-F238E27FC236}">
-                <a16:creationId xmlns:a16="http://schemas.microsoft.com/office/drawing/2014/main" id="{8F24FA07-5B02-495E-9E00-5EF52AB21A87}"/>
-              </a:ext>
-            </a:extLst>
-          </p:cNvPr>
+          <p:cNvPr id="6" name="Slide Number Placeholder 5"/>
           <p:cNvSpPr>
             <a:spLocks noGrp="1"/>
           </p:cNvSpPr>
@@ -934,7 +822,7 @@
     </p:spTree>
     <p:extLst>
       <p:ext uri="{BB962C8B-B14F-4D97-AF65-F5344CB8AC3E}">
-        <p14:creationId xmlns:p14="http://schemas.microsoft.com/office/powerpoint/2010/main" val="1612426416"/>
+        <p14:creationId xmlns:p14="http://schemas.microsoft.com/office/powerpoint/2010/main" val="1778606202"/>
       </p:ext>
     </p:extLst>
   </p:cSld>
@@ -963,13 +851,7 @@
       </p:grpSpPr>
       <p:sp>
         <p:nvSpPr>
-          <p:cNvPr id="2" name="Title 1">
-            <a:extLst>
-              <a:ext uri="{FF2B5EF4-FFF2-40B4-BE49-F238E27FC236}">
-                <a16:creationId xmlns:a16="http://schemas.microsoft.com/office/drawing/2014/main" id="{C623FE6C-8156-4384-9B70-F53BD86368CA}"/>
-              </a:ext>
-            </a:extLst>
-          </p:cNvPr>
+          <p:cNvPr id="2" name="Title 1"/>
           <p:cNvSpPr>
             <a:spLocks noGrp="1"/>
           </p:cNvSpPr>
@@ -979,15 +861,15 @@
         </p:nvSpPr>
         <p:spPr>
           <a:xfrm>
-            <a:off x="831850" y="1709738"/>
-            <a:ext cx="10515600" cy="2852737"/>
+            <a:off x="736859" y="2692444"/>
+            <a:ext cx="9314796" cy="4492401"/>
           </a:xfrm>
         </p:spPr>
         <p:txBody>
           <a:bodyPr anchor="b"/>
           <a:lstStyle>
             <a:lvl1pPr>
-              <a:defRPr sz="6000"/>
+              <a:defRPr sz="7087"/>
             </a:lvl1pPr>
           </a:lstStyle>
           <a:p>
@@ -995,18 +877,13 @@
               <a:rPr lang="en-US"/>
               <a:t>Click to edit Master title style</a:t>
             </a:r>
-          </a:p>
-        </p:txBody>
-      </p:sp>
-      <p:sp>
-        <p:nvSpPr>
-          <p:cNvPr id="3" name="Text Placeholder 2">
-            <a:extLst>
-              <a:ext uri="{FF2B5EF4-FFF2-40B4-BE49-F238E27FC236}">
-                <a16:creationId xmlns:a16="http://schemas.microsoft.com/office/drawing/2014/main" id="{274D730A-9BE3-4D40-BEB3-73FA56D874AA}"/>
-              </a:ext>
-            </a:extLst>
-          </p:cNvPr>
+            <a:endParaRPr lang="en-US" dirty="0"/>
+          </a:p>
+        </p:txBody>
+      </p:sp>
+      <p:sp>
+        <p:nvSpPr>
+          <p:cNvPr id="3" name="Text Placeholder 2"/>
           <p:cNvSpPr>
             <a:spLocks noGrp="1"/>
           </p:cNvSpPr>
@@ -1016,8 +893,8 @@
         </p:nvSpPr>
         <p:spPr>
           <a:xfrm>
-            <a:off x="831850" y="4589463"/>
-            <a:ext cx="10515600" cy="1500187"/>
+            <a:off x="736859" y="7227345"/>
+            <a:ext cx="9314796" cy="2362447"/>
           </a:xfrm>
         </p:spPr>
         <p:txBody>
@@ -1025,87 +902,85 @@
           <a:lstStyle>
             <a:lvl1pPr marL="0" indent="0">
               <a:buNone/>
-              <a:defRPr sz="2400">
+              <a:defRPr sz="2835">
+                <a:solidFill>
+                  <a:schemeClr val="tx1"/>
+                </a:solidFill>
+              </a:defRPr>
+            </a:lvl1pPr>
+            <a:lvl2pPr marL="539999" indent="0">
+              <a:buNone/>
+              <a:defRPr sz="2362">
                 <a:solidFill>
                   <a:schemeClr val="tx1">
                     <a:tint val="75000"/>
                   </a:schemeClr>
                 </a:solidFill>
               </a:defRPr>
-            </a:lvl1pPr>
-            <a:lvl2pPr marL="457200" indent="0">
-              <a:buNone/>
-              <a:defRPr sz="2000">
+            </a:lvl2pPr>
+            <a:lvl3pPr marL="1079998" indent="0">
+              <a:buNone/>
+              <a:defRPr sz="2126">
                 <a:solidFill>
                   <a:schemeClr val="tx1">
                     <a:tint val="75000"/>
                   </a:schemeClr>
                 </a:solidFill>
               </a:defRPr>
-            </a:lvl2pPr>
-            <a:lvl3pPr marL="914400" indent="0">
-              <a:buNone/>
-              <a:defRPr sz="1800">
+            </a:lvl3pPr>
+            <a:lvl4pPr marL="1619997" indent="0">
+              <a:buNone/>
+              <a:defRPr sz="1890">
                 <a:solidFill>
                   <a:schemeClr val="tx1">
                     <a:tint val="75000"/>
                   </a:schemeClr>
                 </a:solidFill>
               </a:defRPr>
-            </a:lvl3pPr>
-            <a:lvl4pPr marL="1371600" indent="0">
-              <a:buNone/>
-              <a:defRPr sz="1600">
+            </a:lvl4pPr>
+            <a:lvl5pPr marL="2159996" indent="0">
+              <a:buNone/>
+              <a:defRPr sz="1890">
                 <a:solidFill>
                   <a:schemeClr val="tx1">
                     <a:tint val="75000"/>
                   </a:schemeClr>
                 </a:solidFill>
               </a:defRPr>
-            </a:lvl4pPr>
-            <a:lvl5pPr marL="1828800" indent="0">
-              <a:buNone/>
-              <a:defRPr sz="1600">
+            </a:lvl5pPr>
+            <a:lvl6pPr marL="2699995" indent="0">
+              <a:buNone/>
+              <a:defRPr sz="1890">
                 <a:solidFill>
                   <a:schemeClr val="tx1">
                     <a:tint val="75000"/>
                   </a:schemeClr>
                 </a:solidFill>
               </a:defRPr>
-            </a:lvl5pPr>
-            <a:lvl6pPr marL="2286000" indent="0">
-              <a:buNone/>
-              <a:defRPr sz="1600">
+            </a:lvl6pPr>
+            <a:lvl7pPr marL="3239994" indent="0">
+              <a:buNone/>
+              <a:defRPr sz="1890">
                 <a:solidFill>
                   <a:schemeClr val="tx1">
                     <a:tint val="75000"/>
                   </a:schemeClr>
                 </a:solidFill>
               </a:defRPr>
-            </a:lvl6pPr>
-            <a:lvl7pPr marL="2743200" indent="0">
-              <a:buNone/>
-              <a:defRPr sz="1600">
+            </a:lvl7pPr>
+            <a:lvl8pPr marL="3779992" indent="0">
+              <a:buNone/>
+              <a:defRPr sz="1890">
                 <a:solidFill>
                   <a:schemeClr val="tx1">
                     <a:tint val="75000"/>
                   </a:schemeClr>
                 </a:solidFill>
               </a:defRPr>
-            </a:lvl7pPr>
-            <a:lvl8pPr marL="3200400" indent="0">
-              <a:buNone/>
-              <a:defRPr sz="1600">
-                <a:solidFill>
-                  <a:schemeClr val="tx1">
-                    <a:tint val="75000"/>
-                  </a:schemeClr>
-                </a:solidFill>
-              </a:defRPr>
             </a:lvl8pPr>
-            <a:lvl9pPr marL="3657600" indent="0">
-              <a:buNone/>
-              <a:defRPr sz="1600">
+            <a:lvl9pPr marL="4319991" indent="0">
+              <a:buNone/>
+              <a:defRPr sz="1890">
                 <a:solidFill>
                   <a:schemeClr val="tx1">
                     <a:tint val="75000"/>
@@ -1125,13 +1000,7 @@
       </p:sp>
       <p:sp>
         <p:nvSpPr>
-          <p:cNvPr id="4" name="Date Placeholder 3">
-            <a:extLst>
-              <a:ext uri="{FF2B5EF4-FFF2-40B4-BE49-F238E27FC236}">
-                <a16:creationId xmlns:a16="http://schemas.microsoft.com/office/drawing/2014/main" id="{DB811AC2-E305-46C2-9FFD-12857AF0C0D2}"/>
-              </a:ext>
-            </a:extLst>
-          </p:cNvPr>
+          <p:cNvPr id="4" name="Date Placeholder 3"/>
           <p:cNvSpPr>
             <a:spLocks noGrp="1"/>
           </p:cNvSpPr>
@@ -1146,7 +1015,7 @@
           <a:p>
             <a:fld id="{2F0D3B1E-FCC1-4A5E-9AAF-BCC374D20566}" type="datetimeFigureOut">
               <a:rPr lang="en-US" smtClean="0"/>
-              <a:t>2021-03-05</a:t>
+              <a:t>2021-06-10</a:t>
             </a:fld>
             <a:endParaRPr lang="en-US"/>
           </a:p>
@@ -1154,13 +1023,7 @@
       </p:sp>
       <p:sp>
         <p:nvSpPr>
-          <p:cNvPr id="5" name="Footer Placeholder 4">
-            <a:extLst>
-              <a:ext uri="{FF2B5EF4-FFF2-40B4-BE49-F238E27FC236}">
-                <a16:creationId xmlns:a16="http://schemas.microsoft.com/office/drawing/2014/main" id="{430AC9A2-6DE6-4F49-854D-1BA878212B22}"/>
-              </a:ext>
-            </a:extLst>
-          </p:cNvPr>
+          <p:cNvPr id="5" name="Footer Placeholder 4"/>
           <p:cNvSpPr>
             <a:spLocks noGrp="1"/>
           </p:cNvSpPr>
@@ -1179,13 +1042,7 @@
       </p:sp>
       <p:sp>
         <p:nvSpPr>
-          <p:cNvPr id="6" name="Slide Number Placeholder 5">
-            <a:extLst>
-              <a:ext uri="{FF2B5EF4-FFF2-40B4-BE49-F238E27FC236}">
-                <a16:creationId xmlns:a16="http://schemas.microsoft.com/office/drawing/2014/main" id="{A26A9A5D-1152-445E-B345-1BF105E83E26}"/>
-              </a:ext>
-            </a:extLst>
-          </p:cNvPr>
+          <p:cNvPr id="6" name="Slide Number Placeholder 5"/>
           <p:cNvSpPr>
             <a:spLocks noGrp="1"/>
           </p:cNvSpPr>
@@ -1209,7 +1066,7 @@
     </p:spTree>
     <p:extLst>
       <p:ext uri="{BB962C8B-B14F-4D97-AF65-F5344CB8AC3E}">
-        <p14:creationId xmlns:p14="http://schemas.microsoft.com/office/powerpoint/2010/main" val="1752162150"/>
+        <p14:creationId xmlns:p14="http://schemas.microsoft.com/office/powerpoint/2010/main" val="3013284259"/>
       </p:ext>
     </p:extLst>
   </p:cSld>
@@ -1238,13 +1095,7 @@
       </p:grpSpPr>
       <p:sp>
         <p:nvSpPr>
-          <p:cNvPr id="2" name="Title 1">
-            <a:extLst>
-              <a:ext uri="{FF2B5EF4-FFF2-40B4-BE49-F238E27FC236}">
-                <a16:creationId xmlns:a16="http://schemas.microsoft.com/office/drawing/2014/main" id="{8BA0F749-3BB1-4213-8C11-D2314D1C8715}"/>
-              </a:ext>
-            </a:extLst>
-          </p:cNvPr>
+          <p:cNvPr id="2" name="Title 1"/>
           <p:cNvSpPr>
             <a:spLocks noGrp="1"/>
           </p:cNvSpPr>
@@ -1261,18 +1112,13 @@
               <a:rPr lang="en-US"/>
               <a:t>Click to edit Master title style</a:t>
             </a:r>
-          </a:p>
-        </p:txBody>
-      </p:sp>
-      <p:sp>
-        <p:nvSpPr>
-          <p:cNvPr id="3" name="Content Placeholder 2">
-            <a:extLst>
-              <a:ext uri="{FF2B5EF4-FFF2-40B4-BE49-F238E27FC236}">
-                <a16:creationId xmlns:a16="http://schemas.microsoft.com/office/drawing/2014/main" id="{33FB5237-0C4A-42D4-8D3C-31F0ADE7B5F6}"/>
-              </a:ext>
-            </a:extLst>
-          </p:cNvPr>
+            <a:endParaRPr lang="en-US" dirty="0"/>
+          </a:p>
+        </p:txBody>
+      </p:sp>
+      <p:sp>
+        <p:nvSpPr>
+          <p:cNvPr id="3" name="Content Placeholder 2"/>
           <p:cNvSpPr>
             <a:spLocks noGrp="1"/>
           </p:cNvSpPr>
@@ -1282,8 +1128,8 @@
         </p:nvSpPr>
         <p:spPr>
           <a:xfrm>
-            <a:off x="838200" y="1825625"/>
-            <a:ext cx="5181600" cy="4351338"/>
+            <a:off x="742484" y="2874937"/>
+            <a:ext cx="4589899" cy="6852350"/>
           </a:xfrm>
         </p:spPr>
         <p:txBody>
@@ -1323,18 +1169,13 @@
               <a:rPr lang="en-US"/>
               <a:t>Fifth level</a:t>
             </a:r>
-          </a:p>
-        </p:txBody>
-      </p:sp>
-      <p:sp>
-        <p:nvSpPr>
-          <p:cNvPr id="4" name="Content Placeholder 3">
-            <a:extLst>
-              <a:ext uri="{FF2B5EF4-FFF2-40B4-BE49-F238E27FC236}">
-                <a16:creationId xmlns:a16="http://schemas.microsoft.com/office/drawing/2014/main" id="{81FE5F85-0400-4790-8DAD-B101F4DE7957}"/>
-              </a:ext>
-            </a:extLst>
-          </p:cNvPr>
+            <a:endParaRPr lang="en-US" dirty="0"/>
+          </a:p>
+        </p:txBody>
+      </p:sp>
+      <p:sp>
+        <p:nvSpPr>
+          <p:cNvPr id="4" name="Content Placeholder 3"/>
           <p:cNvSpPr>
             <a:spLocks noGrp="1"/>
           </p:cNvSpPr>
@@ -1344,8 +1185,8 @@
         </p:nvSpPr>
         <p:spPr>
           <a:xfrm>
-            <a:off x="6172200" y="1825625"/>
-            <a:ext cx="5181600" cy="4351338"/>
+            <a:off x="5467380" y="2874937"/>
+            <a:ext cx="4589899" cy="6852350"/>
           </a:xfrm>
         </p:spPr>
         <p:txBody>
@@ -1385,18 +1226,13 @@
               <a:rPr lang="en-US"/>
               <a:t>Fifth level</a:t>
             </a:r>
-          </a:p>
-        </p:txBody>
-      </p:sp>
-      <p:sp>
-        <p:nvSpPr>
-          <p:cNvPr id="5" name="Date Placeholder 4">
-            <a:extLst>
-              <a:ext uri="{FF2B5EF4-FFF2-40B4-BE49-F238E27FC236}">
-                <a16:creationId xmlns:a16="http://schemas.microsoft.com/office/drawing/2014/main" id="{84099A4A-CD5F-4443-9AEC-30798A101563}"/>
-              </a:ext>
-            </a:extLst>
-          </p:cNvPr>
+            <a:endParaRPr lang="en-US" dirty="0"/>
+          </a:p>
+        </p:txBody>
+      </p:sp>
+      <p:sp>
+        <p:nvSpPr>
+          <p:cNvPr id="5" name="Date Placeholder 4"/>
           <p:cNvSpPr>
             <a:spLocks noGrp="1"/>
           </p:cNvSpPr>
@@ -1411,7 +1247,7 @@
           <a:p>
             <a:fld id="{2F0D3B1E-FCC1-4A5E-9AAF-BCC374D20566}" type="datetimeFigureOut">
               <a:rPr lang="en-US" smtClean="0"/>
-              <a:t>2021-03-05</a:t>
+              <a:t>2021-06-10</a:t>
             </a:fld>
             <a:endParaRPr lang="en-US"/>
           </a:p>
@@ -1419,13 +1255,7 @@
       </p:sp>
       <p:sp>
         <p:nvSpPr>
-          <p:cNvPr id="6" name="Footer Placeholder 5">
-            <a:extLst>
-              <a:ext uri="{FF2B5EF4-FFF2-40B4-BE49-F238E27FC236}">
-                <a16:creationId xmlns:a16="http://schemas.microsoft.com/office/drawing/2014/main" id="{2E59B01D-CE49-469B-8426-815F9AADBB3A}"/>
-              </a:ext>
-            </a:extLst>
-          </p:cNvPr>
+          <p:cNvPr id="6" name="Footer Placeholder 5"/>
           <p:cNvSpPr>
             <a:spLocks noGrp="1"/>
           </p:cNvSpPr>
@@ -1444,13 +1274,7 @@
       </p:sp>
       <p:sp>
         <p:nvSpPr>
-          <p:cNvPr id="7" name="Slide Number Placeholder 6">
-            <a:extLst>
-              <a:ext uri="{FF2B5EF4-FFF2-40B4-BE49-F238E27FC236}">
-                <a16:creationId xmlns:a16="http://schemas.microsoft.com/office/drawing/2014/main" id="{DF31C471-3006-4D92-9B03-ABD7B8E38BDC}"/>
-              </a:ext>
-            </a:extLst>
-          </p:cNvPr>
+          <p:cNvPr id="7" name="Slide Number Placeholder 6"/>
           <p:cNvSpPr>
             <a:spLocks noGrp="1"/>
           </p:cNvSpPr>
@@ -1474,7 +1298,7 @@
     </p:spTree>
     <p:extLst>
       <p:ext uri="{BB962C8B-B14F-4D97-AF65-F5344CB8AC3E}">
-        <p14:creationId xmlns:p14="http://schemas.microsoft.com/office/powerpoint/2010/main" val="2869304847"/>
+        <p14:creationId xmlns:p14="http://schemas.microsoft.com/office/powerpoint/2010/main" val="3765733485"/>
       </p:ext>
     </p:extLst>
   </p:cSld>
@@ -1503,13 +1327,7 @@
       </p:grpSpPr>
       <p:sp>
         <p:nvSpPr>
-          <p:cNvPr id="2" name="Title 1">
-            <a:extLst>
-              <a:ext uri="{FF2B5EF4-FFF2-40B4-BE49-F238E27FC236}">
-                <a16:creationId xmlns:a16="http://schemas.microsoft.com/office/drawing/2014/main" id="{5123FF19-234E-484D-A18A-A93C7C84E12A}"/>
-              </a:ext>
-            </a:extLst>
-          </p:cNvPr>
+          <p:cNvPr id="2" name="Title 1"/>
           <p:cNvSpPr>
             <a:spLocks noGrp="1"/>
           </p:cNvSpPr>
@@ -1519,8 +1337,8 @@
         </p:nvSpPr>
         <p:spPr>
           <a:xfrm>
-            <a:off x="839788" y="365125"/>
-            <a:ext cx="10515600" cy="1325563"/>
+            <a:off x="743890" y="574990"/>
+            <a:ext cx="9314796" cy="2087455"/>
           </a:xfrm>
         </p:spPr>
         <p:txBody>
@@ -1531,18 +1349,13 @@
               <a:rPr lang="en-US"/>
               <a:t>Click to edit Master title style</a:t>
             </a:r>
-          </a:p>
-        </p:txBody>
-      </p:sp>
-      <p:sp>
-        <p:nvSpPr>
-          <p:cNvPr id="3" name="Text Placeholder 2">
-            <a:extLst>
-              <a:ext uri="{FF2B5EF4-FFF2-40B4-BE49-F238E27FC236}">
-                <a16:creationId xmlns:a16="http://schemas.microsoft.com/office/drawing/2014/main" id="{AF1CB30A-30D3-4E7E-9586-9528F1E2F45B}"/>
-              </a:ext>
-            </a:extLst>
-          </p:cNvPr>
+            <a:endParaRPr lang="en-US" dirty="0"/>
+          </a:p>
+        </p:txBody>
+      </p:sp>
+      <p:sp>
+        <p:nvSpPr>
+          <p:cNvPr id="3" name="Text Placeholder 2"/>
           <p:cNvSpPr>
             <a:spLocks noGrp="1"/>
           </p:cNvSpPr>
@@ -1552,8 +1365,8 @@
         </p:nvSpPr>
         <p:spPr>
           <a:xfrm>
-            <a:off x="839788" y="1681163"/>
-            <a:ext cx="5157787" cy="823912"/>
+            <a:off x="743892" y="2647443"/>
+            <a:ext cx="4568805" cy="1297471"/>
           </a:xfrm>
         </p:spPr>
         <p:txBody>
@@ -1561,39 +1374,39 @@
           <a:lstStyle>
             <a:lvl1pPr marL="0" indent="0">
               <a:buNone/>
-              <a:defRPr sz="2400" b="1"/>
+              <a:defRPr sz="2835" b="1"/>
             </a:lvl1pPr>
-            <a:lvl2pPr marL="457200" indent="0">
-              <a:buNone/>
-              <a:defRPr sz="2000" b="1"/>
+            <a:lvl2pPr marL="539999" indent="0">
+              <a:buNone/>
+              <a:defRPr sz="2362" b="1"/>
             </a:lvl2pPr>
-            <a:lvl3pPr marL="914400" indent="0">
-              <a:buNone/>
-              <a:defRPr sz="1800" b="1"/>
+            <a:lvl3pPr marL="1079998" indent="0">
+              <a:buNone/>
+              <a:defRPr sz="2126" b="1"/>
             </a:lvl3pPr>
-            <a:lvl4pPr marL="1371600" indent="0">
-              <a:buNone/>
-              <a:defRPr sz="1600" b="1"/>
+            <a:lvl4pPr marL="1619997" indent="0">
+              <a:buNone/>
+              <a:defRPr sz="1890" b="1"/>
             </a:lvl4pPr>
-            <a:lvl5pPr marL="1828800" indent="0">
-              <a:buNone/>
-              <a:defRPr sz="1600" b="1"/>
+            <a:lvl5pPr marL="2159996" indent="0">
+              <a:buNone/>
+              <a:defRPr sz="1890" b="1"/>
             </a:lvl5pPr>
-            <a:lvl6pPr marL="2286000" indent="0">
-              <a:buNone/>
-              <a:defRPr sz="1600" b="1"/>
+            <a:lvl6pPr marL="2699995" indent="0">
+              <a:buNone/>
+              <a:defRPr sz="1890" b="1"/>
             </a:lvl6pPr>
-            <a:lvl7pPr marL="2743200" indent="0">
-              <a:buNone/>
-              <a:defRPr sz="1600" b="1"/>
+            <a:lvl7pPr marL="3239994" indent="0">
+              <a:buNone/>
+              <a:defRPr sz="1890" b="1"/>
             </a:lvl7pPr>
-            <a:lvl8pPr marL="3200400" indent="0">
-              <a:buNone/>
-              <a:defRPr sz="1600" b="1"/>
+            <a:lvl8pPr marL="3779992" indent="0">
+              <a:buNone/>
+              <a:defRPr sz="1890" b="1"/>
             </a:lvl8pPr>
-            <a:lvl9pPr marL="3657600" indent="0">
-              <a:buNone/>
-              <a:defRPr sz="1600" b="1"/>
+            <a:lvl9pPr marL="4319991" indent="0">
+              <a:buNone/>
+              <a:defRPr sz="1890" b="1"/>
             </a:lvl9pPr>
           </a:lstStyle>
           <a:p>
@@ -1607,13 +1420,7 @@
       </p:sp>
       <p:sp>
         <p:nvSpPr>
-          <p:cNvPr id="4" name="Content Placeholder 3">
-            <a:extLst>
-              <a:ext uri="{FF2B5EF4-FFF2-40B4-BE49-F238E27FC236}">
-                <a16:creationId xmlns:a16="http://schemas.microsoft.com/office/drawing/2014/main" id="{7549F047-7C32-4428-99CD-D9AFD24F1F2B}"/>
-              </a:ext>
-            </a:extLst>
-          </p:cNvPr>
+          <p:cNvPr id="4" name="Content Placeholder 3"/>
           <p:cNvSpPr>
             <a:spLocks noGrp="1"/>
           </p:cNvSpPr>
@@ -1623,8 +1430,8 @@
         </p:nvSpPr>
         <p:spPr>
           <a:xfrm>
-            <a:off x="839788" y="2505075"/>
-            <a:ext cx="5157787" cy="3684588"/>
+            <a:off x="743892" y="3944914"/>
+            <a:ext cx="4568805" cy="5802373"/>
           </a:xfrm>
         </p:spPr>
         <p:txBody>
@@ -1664,18 +1471,13 @@
               <a:rPr lang="en-US"/>
               <a:t>Fifth level</a:t>
             </a:r>
-          </a:p>
-        </p:txBody>
-      </p:sp>
-      <p:sp>
-        <p:nvSpPr>
-          <p:cNvPr id="5" name="Text Placeholder 4">
-            <a:extLst>
-              <a:ext uri="{FF2B5EF4-FFF2-40B4-BE49-F238E27FC236}">
-                <a16:creationId xmlns:a16="http://schemas.microsoft.com/office/drawing/2014/main" id="{DA6CF41E-37A3-48BC-A673-AB02E97AC807}"/>
-              </a:ext>
-            </a:extLst>
-          </p:cNvPr>
+            <a:endParaRPr lang="en-US" dirty="0"/>
+          </a:p>
+        </p:txBody>
+      </p:sp>
+      <p:sp>
+        <p:nvSpPr>
+          <p:cNvPr id="5" name="Text Placeholder 4"/>
           <p:cNvSpPr>
             <a:spLocks noGrp="1"/>
           </p:cNvSpPr>
@@ -1685,8 +1487,8 @@
         </p:nvSpPr>
         <p:spPr>
           <a:xfrm>
-            <a:off x="6172200" y="1681163"/>
-            <a:ext cx="5183188" cy="823912"/>
+            <a:off x="5467381" y="2647443"/>
+            <a:ext cx="4591306" cy="1297471"/>
           </a:xfrm>
         </p:spPr>
         <p:txBody>
@@ -1694,39 +1496,39 @@
           <a:lstStyle>
             <a:lvl1pPr marL="0" indent="0">
               <a:buNone/>
-              <a:defRPr sz="2400" b="1"/>
+              <a:defRPr sz="2835" b="1"/>
             </a:lvl1pPr>
-            <a:lvl2pPr marL="457200" indent="0">
-              <a:buNone/>
-              <a:defRPr sz="2000" b="1"/>
+            <a:lvl2pPr marL="539999" indent="0">
+              <a:buNone/>
+              <a:defRPr sz="2362" b="1"/>
             </a:lvl2pPr>
-            <a:lvl3pPr marL="914400" indent="0">
-              <a:buNone/>
-              <a:defRPr sz="1800" b="1"/>
+            <a:lvl3pPr marL="1079998" indent="0">
+              <a:buNone/>
+              <a:defRPr sz="2126" b="1"/>
             </a:lvl3pPr>
-            <a:lvl4pPr marL="1371600" indent="0">
-              <a:buNone/>
-              <a:defRPr sz="1600" b="1"/>
+            <a:lvl4pPr marL="1619997" indent="0">
+              <a:buNone/>
+              <a:defRPr sz="1890" b="1"/>
             </a:lvl4pPr>
-            <a:lvl5pPr marL="1828800" indent="0">
-              <a:buNone/>
-              <a:defRPr sz="1600" b="1"/>
+            <a:lvl5pPr marL="2159996" indent="0">
+              <a:buNone/>
+              <a:defRPr sz="1890" b="1"/>
             </a:lvl5pPr>
-            <a:lvl6pPr marL="2286000" indent="0">
-              <a:buNone/>
-              <a:defRPr sz="1600" b="1"/>
+            <a:lvl6pPr marL="2699995" indent="0">
+              <a:buNone/>
+              <a:defRPr sz="1890" b="1"/>
             </a:lvl6pPr>
-            <a:lvl7pPr marL="2743200" indent="0">
-              <a:buNone/>
-              <a:defRPr sz="1600" b="1"/>
+            <a:lvl7pPr marL="3239994" indent="0">
+              <a:buNone/>
+              <a:defRPr sz="1890" b="1"/>
             </a:lvl7pPr>
-            <a:lvl8pPr marL="3200400" indent="0">
-              <a:buNone/>
-              <a:defRPr sz="1600" b="1"/>
+            <a:lvl8pPr marL="3779992" indent="0">
+              <a:buNone/>
+              <a:defRPr sz="1890" b="1"/>
             </a:lvl8pPr>
-            <a:lvl9pPr marL="3657600" indent="0">
-              <a:buNone/>
-              <a:defRPr sz="1600" b="1"/>
+            <a:lvl9pPr marL="4319991" indent="0">
+              <a:buNone/>
+              <a:defRPr sz="1890" b="1"/>
             </a:lvl9pPr>
           </a:lstStyle>
           <a:p>
@@ -1740,13 +1542,7 @@
       </p:sp>
       <p:sp>
         <p:nvSpPr>
-          <p:cNvPr id="6" name="Content Placeholder 5">
-            <a:extLst>
-              <a:ext uri="{FF2B5EF4-FFF2-40B4-BE49-F238E27FC236}">
-                <a16:creationId xmlns:a16="http://schemas.microsoft.com/office/drawing/2014/main" id="{1C3E408F-AA79-492E-A69C-BDB1D9F5DCDA}"/>
-              </a:ext>
-            </a:extLst>
-          </p:cNvPr>
+          <p:cNvPr id="6" name="Content Placeholder 5"/>
           <p:cNvSpPr>
             <a:spLocks noGrp="1"/>
           </p:cNvSpPr>
@@ -1756,8 +1552,8 @@
         </p:nvSpPr>
         <p:spPr>
           <a:xfrm>
-            <a:off x="6172200" y="2505075"/>
-            <a:ext cx="5183188" cy="3684588"/>
+            <a:off x="5467381" y="3944914"/>
+            <a:ext cx="4591306" cy="5802373"/>
           </a:xfrm>
         </p:spPr>
         <p:txBody>
@@ -1797,18 +1593,13 @@
               <a:rPr lang="en-US"/>
               <a:t>Fifth level</a:t>
             </a:r>
-          </a:p>
-        </p:txBody>
-      </p:sp>
-      <p:sp>
-        <p:nvSpPr>
-          <p:cNvPr id="7" name="Date Placeholder 6">
-            <a:extLst>
-              <a:ext uri="{FF2B5EF4-FFF2-40B4-BE49-F238E27FC236}">
-                <a16:creationId xmlns:a16="http://schemas.microsoft.com/office/drawing/2014/main" id="{B4FB4FD9-DCC4-4FCA-956F-6D38542F2FA2}"/>
-              </a:ext>
-            </a:extLst>
-          </p:cNvPr>
+            <a:endParaRPr lang="en-US" dirty="0"/>
+          </a:p>
+        </p:txBody>
+      </p:sp>
+      <p:sp>
+        <p:nvSpPr>
+          <p:cNvPr id="7" name="Date Placeholder 6"/>
           <p:cNvSpPr>
             <a:spLocks noGrp="1"/>
           </p:cNvSpPr>
@@ -1823,7 +1614,7 @@
           <a:p>
             <a:fld id="{2F0D3B1E-FCC1-4A5E-9AAF-BCC374D20566}" type="datetimeFigureOut">
               <a:rPr lang="en-US" smtClean="0"/>
-              <a:t>2021-03-05</a:t>
+              <a:t>2021-06-10</a:t>
             </a:fld>
             <a:endParaRPr lang="en-US"/>
           </a:p>
@@ -1831,13 +1622,7 @@
       </p:sp>
       <p:sp>
         <p:nvSpPr>
-          <p:cNvPr id="8" name="Footer Placeholder 7">
-            <a:extLst>
-              <a:ext uri="{FF2B5EF4-FFF2-40B4-BE49-F238E27FC236}">
-                <a16:creationId xmlns:a16="http://schemas.microsoft.com/office/drawing/2014/main" id="{0AD5FAC8-9164-450D-9A0B-DFB080845885}"/>
-              </a:ext>
-            </a:extLst>
-          </p:cNvPr>
+          <p:cNvPr id="8" name="Footer Placeholder 7"/>
           <p:cNvSpPr>
             <a:spLocks noGrp="1"/>
           </p:cNvSpPr>
@@ -1856,13 +1641,7 @@
       </p:sp>
       <p:sp>
         <p:nvSpPr>
-          <p:cNvPr id="9" name="Slide Number Placeholder 8">
-            <a:extLst>
-              <a:ext uri="{FF2B5EF4-FFF2-40B4-BE49-F238E27FC236}">
-                <a16:creationId xmlns:a16="http://schemas.microsoft.com/office/drawing/2014/main" id="{C5C20398-2047-4AAB-893D-7C5130E46CEA}"/>
-              </a:ext>
-            </a:extLst>
-          </p:cNvPr>
+          <p:cNvPr id="9" name="Slide Number Placeholder 8"/>
           <p:cNvSpPr>
             <a:spLocks noGrp="1"/>
           </p:cNvSpPr>
@@ -1886,7 +1665,7 @@
     </p:spTree>
     <p:extLst>
       <p:ext uri="{BB962C8B-B14F-4D97-AF65-F5344CB8AC3E}">
-        <p14:creationId xmlns:p14="http://schemas.microsoft.com/office/powerpoint/2010/main" val="4285704503"/>
+        <p14:creationId xmlns:p14="http://schemas.microsoft.com/office/powerpoint/2010/main" val="3100358893"/>
       </p:ext>
     </p:extLst>
   </p:cSld>
@@ -1915,13 +1694,7 @@
       </p:grpSpPr>
       <p:sp>
         <p:nvSpPr>
-          <p:cNvPr id="2" name="Title 1">
-            <a:extLst>
-              <a:ext uri="{FF2B5EF4-FFF2-40B4-BE49-F238E27FC236}">
-                <a16:creationId xmlns:a16="http://schemas.microsoft.com/office/drawing/2014/main" id="{04BAF744-5313-4404-A1D6-F4B593165F73}"/>
-              </a:ext>
-            </a:extLst>
-          </p:cNvPr>
+          <p:cNvPr id="2" name="Title 1"/>
           <p:cNvSpPr>
             <a:spLocks noGrp="1"/>
           </p:cNvSpPr>
@@ -1938,18 +1711,13 @@
               <a:rPr lang="en-US"/>
               <a:t>Click to edit Master title style</a:t>
             </a:r>
-          </a:p>
-        </p:txBody>
-      </p:sp>
-      <p:sp>
-        <p:nvSpPr>
-          <p:cNvPr id="3" name="Date Placeholder 2">
-            <a:extLst>
-              <a:ext uri="{FF2B5EF4-FFF2-40B4-BE49-F238E27FC236}">
-                <a16:creationId xmlns:a16="http://schemas.microsoft.com/office/drawing/2014/main" id="{1B9CDC58-C5B0-4317-98F9-FB412CE9AA2C}"/>
-              </a:ext>
-            </a:extLst>
-          </p:cNvPr>
+            <a:endParaRPr lang="en-US" dirty="0"/>
+          </a:p>
+        </p:txBody>
+      </p:sp>
+      <p:sp>
+        <p:nvSpPr>
+          <p:cNvPr id="3" name="Date Placeholder 2"/>
           <p:cNvSpPr>
             <a:spLocks noGrp="1"/>
           </p:cNvSpPr>
@@ -1964,7 +1732,7 @@
           <a:p>
             <a:fld id="{2F0D3B1E-FCC1-4A5E-9AAF-BCC374D20566}" type="datetimeFigureOut">
               <a:rPr lang="en-US" smtClean="0"/>
-              <a:t>2021-03-05</a:t>
+              <a:t>2021-06-10</a:t>
             </a:fld>
             <a:endParaRPr lang="en-US"/>
           </a:p>
@@ -1972,13 +1740,7 @@
       </p:sp>
       <p:sp>
         <p:nvSpPr>
-          <p:cNvPr id="4" name="Footer Placeholder 3">
-            <a:extLst>
-              <a:ext uri="{FF2B5EF4-FFF2-40B4-BE49-F238E27FC236}">
-                <a16:creationId xmlns:a16="http://schemas.microsoft.com/office/drawing/2014/main" id="{83E37276-CA53-4829-B995-7E0634B763F3}"/>
-              </a:ext>
-            </a:extLst>
-          </p:cNvPr>
+          <p:cNvPr id="4" name="Footer Placeholder 3"/>
           <p:cNvSpPr>
             <a:spLocks noGrp="1"/>
           </p:cNvSpPr>
@@ -1997,13 +1759,7 @@
       </p:sp>
       <p:sp>
         <p:nvSpPr>
-          <p:cNvPr id="5" name="Slide Number Placeholder 4">
-            <a:extLst>
-              <a:ext uri="{FF2B5EF4-FFF2-40B4-BE49-F238E27FC236}">
-                <a16:creationId xmlns:a16="http://schemas.microsoft.com/office/drawing/2014/main" id="{59CFB9B0-602D-44FD-AA59-72390DE6EE3B}"/>
-              </a:ext>
-            </a:extLst>
-          </p:cNvPr>
+          <p:cNvPr id="5" name="Slide Number Placeholder 4"/>
           <p:cNvSpPr>
             <a:spLocks noGrp="1"/>
           </p:cNvSpPr>
@@ -2027,7 +1783,7 @@
     </p:spTree>
     <p:extLst>
       <p:ext uri="{BB962C8B-B14F-4D97-AF65-F5344CB8AC3E}">
-        <p14:creationId xmlns:p14="http://schemas.microsoft.com/office/powerpoint/2010/main" val="2329415743"/>
+        <p14:creationId xmlns:p14="http://schemas.microsoft.com/office/powerpoint/2010/main" val="4166468855"/>
       </p:ext>
     </p:extLst>
   </p:cSld>
@@ -2056,13 +1812,7 @@
       </p:grpSpPr>
       <p:sp>
         <p:nvSpPr>
-          <p:cNvPr id="2" name="Date Placeholder 1">
-            <a:extLst>
-              <a:ext uri="{FF2B5EF4-FFF2-40B4-BE49-F238E27FC236}">
-                <a16:creationId xmlns:a16="http://schemas.microsoft.com/office/drawing/2014/main" id="{15CF3082-9DCC-40A2-834F-3AF8F3EDEB6D}"/>
-              </a:ext>
-            </a:extLst>
-          </p:cNvPr>
+          <p:cNvPr id="2" name="Date Placeholder 1"/>
           <p:cNvSpPr>
             <a:spLocks noGrp="1"/>
           </p:cNvSpPr>
@@ -2077,7 +1827,7 @@
           <a:p>
             <a:fld id="{2F0D3B1E-FCC1-4A5E-9AAF-BCC374D20566}" type="datetimeFigureOut">
               <a:rPr lang="en-US" smtClean="0"/>
-              <a:t>2021-03-05</a:t>
+              <a:t>2021-06-10</a:t>
             </a:fld>
             <a:endParaRPr lang="en-US"/>
           </a:p>
@@ -2085,13 +1835,7 @@
       </p:sp>
       <p:sp>
         <p:nvSpPr>
-          <p:cNvPr id="3" name="Footer Placeholder 2">
-            <a:extLst>
-              <a:ext uri="{FF2B5EF4-FFF2-40B4-BE49-F238E27FC236}">
-                <a16:creationId xmlns:a16="http://schemas.microsoft.com/office/drawing/2014/main" id="{4483ABC9-747A-4A2F-AE31-E8C441829497}"/>
-              </a:ext>
-            </a:extLst>
-          </p:cNvPr>
+          <p:cNvPr id="3" name="Footer Placeholder 2"/>
           <p:cNvSpPr>
             <a:spLocks noGrp="1"/>
           </p:cNvSpPr>
@@ -2110,13 +1854,7 @@
       </p:sp>
       <p:sp>
         <p:nvSpPr>
-          <p:cNvPr id="4" name="Slide Number Placeholder 3">
-            <a:extLst>
-              <a:ext uri="{FF2B5EF4-FFF2-40B4-BE49-F238E27FC236}">
-                <a16:creationId xmlns:a16="http://schemas.microsoft.com/office/drawing/2014/main" id="{DC0BCE34-00D1-4E2B-889B-A55304EB7C0B}"/>
-              </a:ext>
-            </a:extLst>
-          </p:cNvPr>
+          <p:cNvPr id="4" name="Slide Number Placeholder 3"/>
           <p:cNvSpPr>
             <a:spLocks noGrp="1"/>
           </p:cNvSpPr>
@@ -2140,7 +1878,7 @@
     </p:spTree>
     <p:extLst>
       <p:ext uri="{BB962C8B-B14F-4D97-AF65-F5344CB8AC3E}">
-        <p14:creationId xmlns:p14="http://schemas.microsoft.com/office/powerpoint/2010/main" val="1250889116"/>
+        <p14:creationId xmlns:p14="http://schemas.microsoft.com/office/powerpoint/2010/main" val="2693520396"/>
       </p:ext>
     </p:extLst>
   </p:cSld>
@@ -2169,13 +1907,7 @@
       </p:grpSpPr>
       <p:sp>
         <p:nvSpPr>
-          <p:cNvPr id="2" name="Title 1">
-            <a:extLst>
-              <a:ext uri="{FF2B5EF4-FFF2-40B4-BE49-F238E27FC236}">
-                <a16:creationId xmlns:a16="http://schemas.microsoft.com/office/drawing/2014/main" id="{A199C9AA-63E1-40D7-B3A9-D26DD610E17C}"/>
-              </a:ext>
-            </a:extLst>
-          </p:cNvPr>
+          <p:cNvPr id="2" name="Title 1"/>
           <p:cNvSpPr>
             <a:spLocks noGrp="1"/>
           </p:cNvSpPr>
@@ -2185,15 +1917,15 @@
         </p:nvSpPr>
         <p:spPr>
           <a:xfrm>
-            <a:off x="839788" y="457200"/>
-            <a:ext cx="3932237" cy="1600200"/>
+            <a:off x="743890" y="719984"/>
+            <a:ext cx="3483205" cy="2519945"/>
           </a:xfrm>
         </p:spPr>
         <p:txBody>
           <a:bodyPr anchor="b"/>
           <a:lstStyle>
             <a:lvl1pPr>
-              <a:defRPr sz="3200"/>
+              <a:defRPr sz="3780"/>
             </a:lvl1pPr>
           </a:lstStyle>
           <a:p>
@@ -2201,18 +1933,13 @@
               <a:rPr lang="en-US"/>
               <a:t>Click to edit Master title style</a:t>
             </a:r>
-          </a:p>
-        </p:txBody>
-      </p:sp>
-      <p:sp>
-        <p:nvSpPr>
-          <p:cNvPr id="3" name="Content Placeholder 2">
-            <a:extLst>
-              <a:ext uri="{FF2B5EF4-FFF2-40B4-BE49-F238E27FC236}">
-                <a16:creationId xmlns:a16="http://schemas.microsoft.com/office/drawing/2014/main" id="{04897D15-ACDB-43FB-A7EE-EB0DCCADFC3D}"/>
-              </a:ext>
-            </a:extLst>
-          </p:cNvPr>
+            <a:endParaRPr lang="en-US" dirty="0"/>
+          </a:p>
+        </p:txBody>
+      </p:sp>
+      <p:sp>
+        <p:nvSpPr>
+          <p:cNvPr id="3" name="Content Placeholder 2"/>
           <p:cNvSpPr>
             <a:spLocks noGrp="1"/>
           </p:cNvSpPr>
@@ -2222,39 +1949,39 @@
         </p:nvSpPr>
         <p:spPr>
           <a:xfrm>
-            <a:off x="5183188" y="987425"/>
-            <a:ext cx="6172200" cy="4873625"/>
+            <a:off x="4591306" y="1554968"/>
+            <a:ext cx="5467380" cy="7674832"/>
           </a:xfrm>
         </p:spPr>
         <p:txBody>
           <a:bodyPr/>
           <a:lstStyle>
             <a:lvl1pPr>
-              <a:defRPr sz="3200"/>
+              <a:defRPr sz="3780"/>
             </a:lvl1pPr>
             <a:lvl2pPr>
-              <a:defRPr sz="2800"/>
+              <a:defRPr sz="3307"/>
             </a:lvl2pPr>
             <a:lvl3pPr>
-              <a:defRPr sz="2400"/>
+              <a:defRPr sz="2835"/>
             </a:lvl3pPr>
             <a:lvl4pPr>
-              <a:defRPr sz="2000"/>
+              <a:defRPr sz="2362"/>
             </a:lvl4pPr>
             <a:lvl5pPr>
-              <a:defRPr sz="2000"/>
+              <a:defRPr sz="2362"/>
             </a:lvl5pPr>
             <a:lvl6pPr>
-              <a:defRPr sz="2000"/>
+              <a:defRPr sz="2362"/>
             </a:lvl6pPr>
             <a:lvl7pPr>
-              <a:defRPr sz="2000"/>
+              <a:defRPr sz="2362"/>
             </a:lvl7pPr>
             <a:lvl8pPr>
-              <a:defRPr sz="2000"/>
+              <a:defRPr sz="2362"/>
             </a:lvl8pPr>
             <a:lvl9pPr>
-              <a:defRPr sz="2000"/>
+              <a:defRPr sz="2362"/>
             </a:lvl9pPr>
           </a:lstStyle>
           <a:p>
@@ -2291,18 +2018,13 @@
               <a:rPr lang="en-US"/>
               <a:t>Fifth level</a:t>
             </a:r>
-          </a:p>
-        </p:txBody>
-      </p:sp>
-      <p:sp>
-        <p:nvSpPr>
-          <p:cNvPr id="4" name="Text Placeholder 3">
-            <a:extLst>
-              <a:ext uri="{FF2B5EF4-FFF2-40B4-BE49-F238E27FC236}">
-                <a16:creationId xmlns:a16="http://schemas.microsoft.com/office/drawing/2014/main" id="{97440573-66DD-4682-84DB-EDDB3339DCAD}"/>
-              </a:ext>
-            </a:extLst>
-          </p:cNvPr>
+            <a:endParaRPr lang="en-US" dirty="0"/>
+          </a:p>
+        </p:txBody>
+      </p:sp>
+      <p:sp>
+        <p:nvSpPr>
+          <p:cNvPr id="4" name="Text Placeholder 3"/>
           <p:cNvSpPr>
             <a:spLocks noGrp="1"/>
           </p:cNvSpPr>
@@ -2312,8 +2034,8 @@
         </p:nvSpPr>
         <p:spPr>
           <a:xfrm>
-            <a:off x="839788" y="2057400"/>
-            <a:ext cx="3932237" cy="3811588"/>
+            <a:off x="743890" y="3239929"/>
+            <a:ext cx="3483205" cy="6002369"/>
           </a:xfrm>
         </p:spPr>
         <p:txBody>
@@ -2321,39 +2043,39 @@
           <a:lstStyle>
             <a:lvl1pPr marL="0" indent="0">
               <a:buNone/>
-              <a:defRPr sz="1600"/>
+              <a:defRPr sz="1890"/>
             </a:lvl1pPr>
-            <a:lvl2pPr marL="457200" indent="0">
-              <a:buNone/>
-              <a:defRPr sz="1400"/>
+            <a:lvl2pPr marL="539999" indent="0">
+              <a:buNone/>
+              <a:defRPr sz="1654"/>
             </a:lvl2pPr>
-            <a:lvl3pPr marL="914400" indent="0">
-              <a:buNone/>
-              <a:defRPr sz="1200"/>
+            <a:lvl3pPr marL="1079998" indent="0">
+              <a:buNone/>
+              <a:defRPr sz="1417"/>
             </a:lvl3pPr>
-            <a:lvl4pPr marL="1371600" indent="0">
-              <a:buNone/>
-              <a:defRPr sz="1000"/>
+            <a:lvl4pPr marL="1619997" indent="0">
+              <a:buNone/>
+              <a:defRPr sz="1181"/>
             </a:lvl4pPr>
-            <a:lvl5pPr marL="1828800" indent="0">
-              <a:buNone/>
-              <a:defRPr sz="1000"/>
+            <a:lvl5pPr marL="2159996" indent="0">
+              <a:buNone/>
+              <a:defRPr sz="1181"/>
             </a:lvl5pPr>
-            <a:lvl6pPr marL="2286000" indent="0">
-              <a:buNone/>
-              <a:defRPr sz="1000"/>
+            <a:lvl6pPr marL="2699995" indent="0">
+              <a:buNone/>
+              <a:defRPr sz="1181"/>
             </a:lvl6pPr>
-            <a:lvl7pPr marL="2743200" indent="0">
-              <a:buNone/>
-              <a:defRPr sz="1000"/>
+            <a:lvl7pPr marL="3239994" indent="0">
+              <a:buNone/>
+              <a:defRPr sz="1181"/>
             </a:lvl7pPr>
-            <a:lvl8pPr marL="3200400" indent="0">
-              <a:buNone/>
-              <a:defRPr sz="1000"/>
+            <a:lvl8pPr marL="3779992" indent="0">
+              <a:buNone/>
+              <a:defRPr sz="1181"/>
             </a:lvl8pPr>
-            <a:lvl9pPr marL="3657600" indent="0">
-              <a:buNone/>
-              <a:defRPr sz="1000"/>
+            <a:lvl9pPr marL="4319991" indent="0">
+              <a:buNone/>
+              <a:defRPr sz="1181"/>
             </a:lvl9pPr>
           </a:lstStyle>
           <a:p>
@@ -2367,13 +2089,7 @@
       </p:sp>
       <p:sp>
         <p:nvSpPr>
-          <p:cNvPr id="5" name="Date Placeholder 4">
-            <a:extLst>
-              <a:ext uri="{FF2B5EF4-FFF2-40B4-BE49-F238E27FC236}">
-                <a16:creationId xmlns:a16="http://schemas.microsoft.com/office/drawing/2014/main" id="{F7DED3DD-F4A4-4DFB-ACE2-666340C6B914}"/>
-              </a:ext>
-            </a:extLst>
-          </p:cNvPr>
+          <p:cNvPr id="5" name="Date Placeholder 4"/>
           <p:cNvSpPr>
             <a:spLocks noGrp="1"/>
           </p:cNvSpPr>
@@ -2388,7 +2104,7 @@
           <a:p>
             <a:fld id="{2F0D3B1E-FCC1-4A5E-9AAF-BCC374D20566}" type="datetimeFigureOut">
               <a:rPr lang="en-US" smtClean="0"/>
-              <a:t>2021-03-05</a:t>
+              <a:t>2021-06-10</a:t>
             </a:fld>
             <a:endParaRPr lang="en-US"/>
           </a:p>
@@ -2396,13 +2112,7 @@
       </p:sp>
       <p:sp>
         <p:nvSpPr>
-          <p:cNvPr id="6" name="Footer Placeholder 5">
-            <a:extLst>
-              <a:ext uri="{FF2B5EF4-FFF2-40B4-BE49-F238E27FC236}">
-                <a16:creationId xmlns:a16="http://schemas.microsoft.com/office/drawing/2014/main" id="{AFC36B83-8D43-42C8-B63A-71C701BE40CC}"/>
-              </a:ext>
-            </a:extLst>
-          </p:cNvPr>
+          <p:cNvPr id="6" name="Footer Placeholder 5"/>
           <p:cNvSpPr>
             <a:spLocks noGrp="1"/>
           </p:cNvSpPr>
@@ -2421,13 +2131,7 @@
       </p:sp>
       <p:sp>
         <p:nvSpPr>
-          <p:cNvPr id="7" name="Slide Number Placeholder 6">
-            <a:extLst>
-              <a:ext uri="{FF2B5EF4-FFF2-40B4-BE49-F238E27FC236}">
-                <a16:creationId xmlns:a16="http://schemas.microsoft.com/office/drawing/2014/main" id="{C051F597-7D7E-4D75-840F-9D483B33D3D1}"/>
-              </a:ext>
-            </a:extLst>
-          </p:cNvPr>
+          <p:cNvPr id="7" name="Slide Number Placeholder 6"/>
           <p:cNvSpPr>
             <a:spLocks noGrp="1"/>
           </p:cNvSpPr>
@@ -2451,7 +2155,7 @@
     </p:spTree>
     <p:extLst>
       <p:ext uri="{BB962C8B-B14F-4D97-AF65-F5344CB8AC3E}">
-        <p14:creationId xmlns:p14="http://schemas.microsoft.com/office/powerpoint/2010/main" val="762475751"/>
+        <p14:creationId xmlns:p14="http://schemas.microsoft.com/office/powerpoint/2010/main" val="3775868249"/>
       </p:ext>
     </p:extLst>
   </p:cSld>
@@ -2480,13 +2184,7 @@
       </p:grpSpPr>
       <p:sp>
         <p:nvSpPr>
-          <p:cNvPr id="2" name="Title 1">
-            <a:extLst>
-              <a:ext uri="{FF2B5EF4-FFF2-40B4-BE49-F238E27FC236}">
-                <a16:creationId xmlns:a16="http://schemas.microsoft.com/office/drawing/2014/main" id="{0A704219-9742-49D7-A50C-A0F4B6A1D5E9}"/>
-              </a:ext>
-            </a:extLst>
-          </p:cNvPr>
+          <p:cNvPr id="2" name="Title 1"/>
           <p:cNvSpPr>
             <a:spLocks noGrp="1"/>
           </p:cNvSpPr>
@@ -2496,15 +2194,15 @@
         </p:nvSpPr>
         <p:spPr>
           <a:xfrm>
-            <a:off x="839788" y="457200"/>
-            <a:ext cx="3932237" cy="1600200"/>
+            <a:off x="743890" y="719984"/>
+            <a:ext cx="3483205" cy="2519945"/>
           </a:xfrm>
         </p:spPr>
         <p:txBody>
           <a:bodyPr anchor="b"/>
           <a:lstStyle>
             <a:lvl1pPr>
-              <a:defRPr sz="3200"/>
+              <a:defRPr sz="3780"/>
             </a:lvl1pPr>
           </a:lstStyle>
           <a:p>
@@ -2512,20 +2210,15 @@
               <a:rPr lang="en-US"/>
               <a:t>Click to edit Master title style</a:t>
             </a:r>
-          </a:p>
-        </p:txBody>
-      </p:sp>
-      <p:sp>
-        <p:nvSpPr>
-          <p:cNvPr id="3" name="Picture Placeholder 2">
-            <a:extLst>
-              <a:ext uri="{FF2B5EF4-FFF2-40B4-BE49-F238E27FC236}">
-                <a16:creationId xmlns:a16="http://schemas.microsoft.com/office/drawing/2014/main" id="{5BAC390E-2683-4977-867D-FFE53203160D}"/>
-              </a:ext>
-            </a:extLst>
-          </p:cNvPr>
-          <p:cNvSpPr>
-            <a:spLocks noGrp="1"/>
+            <a:endParaRPr lang="en-US" dirty="0"/>
+          </a:p>
+        </p:txBody>
+      </p:sp>
+      <p:sp>
+        <p:nvSpPr>
+          <p:cNvPr id="3" name="Picture Placeholder 2"/>
+          <p:cNvSpPr>
+            <a:spLocks noGrp="1" noChangeAspect="1"/>
           </p:cNvSpPr>
           <p:nvPr>
             <p:ph type="pic" idx="1"/>
@@ -2533,8 +2226,73 @@
         </p:nvSpPr>
         <p:spPr>
           <a:xfrm>
-            <a:off x="5183188" y="987425"/>
-            <a:ext cx="6172200" cy="4873625"/>
+            <a:off x="4591306" y="1554968"/>
+            <a:ext cx="5467380" cy="7674832"/>
+          </a:xfrm>
+        </p:spPr>
+        <p:txBody>
+          <a:bodyPr anchor="t"/>
+          <a:lstStyle>
+            <a:lvl1pPr marL="0" indent="0">
+              <a:buNone/>
+              <a:defRPr sz="3780"/>
+            </a:lvl1pPr>
+            <a:lvl2pPr marL="539999" indent="0">
+              <a:buNone/>
+              <a:defRPr sz="3307"/>
+            </a:lvl2pPr>
+            <a:lvl3pPr marL="1079998" indent="0">
+              <a:buNone/>
+              <a:defRPr sz="2835"/>
+            </a:lvl3pPr>
+            <a:lvl4pPr marL="1619997" indent="0">
+              <a:buNone/>
+              <a:defRPr sz="2362"/>
+            </a:lvl4pPr>
+            <a:lvl5pPr marL="2159996" indent="0">
+              <a:buNone/>
+              <a:defRPr sz="2362"/>
+            </a:lvl5pPr>
+            <a:lvl6pPr marL="2699995" indent="0">
+              <a:buNone/>
+              <a:defRPr sz="2362"/>
+            </a:lvl6pPr>
+            <a:lvl7pPr marL="3239994" indent="0">
+              <a:buNone/>
+              <a:defRPr sz="2362"/>
+            </a:lvl7pPr>
+            <a:lvl8pPr marL="3779992" indent="0">
+              <a:buNone/>
+              <a:defRPr sz="2362"/>
+            </a:lvl8pPr>
+            <a:lvl9pPr marL="4319991" indent="0">
+              <a:buNone/>
+              <a:defRPr sz="2362"/>
+            </a:lvl9pPr>
+          </a:lstStyle>
+          <a:p>
+            <a:r>
+              <a:rPr lang="en-US"/>
+              <a:t>Click icon to add picture</a:t>
+            </a:r>
+            <a:endParaRPr lang="en-US" dirty="0"/>
+          </a:p>
+        </p:txBody>
+      </p:sp>
+      <p:sp>
+        <p:nvSpPr>
+          <p:cNvPr id="4" name="Text Placeholder 3"/>
+          <p:cNvSpPr>
+            <a:spLocks noGrp="1"/>
+          </p:cNvSpPr>
+          <p:nvPr>
+            <p:ph type="body" sz="half" idx="2"/>
+          </p:nvPr>
+        </p:nvSpPr>
+        <p:spPr>
+          <a:xfrm>
+            <a:off x="743890" y="3239929"/>
+            <a:ext cx="3483205" cy="6002369"/>
           </a:xfrm>
         </p:spPr>
         <p:txBody>
@@ -2542,109 +2300,42 @@
           <a:lstStyle>
             <a:lvl1pPr marL="0" indent="0">
               <a:buNone/>
-              <a:defRPr sz="3200"/>
+              <a:defRPr sz="1890"/>
             </a:lvl1pPr>
-            <a:lvl2pPr marL="457200" indent="0">
-              <a:buNone/>
-              <a:defRPr sz="2800"/>
+            <a:lvl2pPr marL="539999" indent="0">
+              <a:buNone/>
+              <a:defRPr sz="1654"/>
             </a:lvl2pPr>
-            <a:lvl3pPr marL="914400" indent="0">
-              <a:buNone/>
-              <a:defRPr sz="2400"/>
+            <a:lvl3pPr marL="1079998" indent="0">
+              <a:buNone/>
+              <a:defRPr sz="1417"/>
             </a:lvl3pPr>
-            <a:lvl4pPr marL="1371600" indent="0">
-              <a:buNone/>
-              <a:defRPr sz="2000"/>
+            <a:lvl4pPr marL="1619997" indent="0">
+              <a:buNone/>
+              <a:defRPr sz="1181"/>
             </a:lvl4pPr>
-            <a:lvl5pPr marL="1828800" indent="0">
-              <a:buNone/>
-              <a:defRPr sz="2000"/>
+            <a:lvl5pPr marL="2159996" indent="0">
+              <a:buNone/>
+              <a:defRPr sz="1181"/>
             </a:lvl5pPr>
-            <a:lvl6pPr marL="2286000" indent="0">
-              <a:buNone/>
-              <a:defRPr sz="2000"/>
+            <a:lvl6pPr marL="2699995" indent="0">
+              <a:buNone/>
+              <a:defRPr sz="1181"/>
             </a:lvl6pPr>
-            <a:lvl7pPr marL="2743200" indent="0">
-              <a:buNone/>
-              <a:defRPr sz="2000"/>
+            <a:lvl7pPr marL="3239994" indent="0">
+              <a:buNone/>
+              <a:defRPr sz="1181"/>
             </a:lvl7pPr>
-            <a:lvl8pPr marL="3200400" indent="0">
-              <a:buNone/>
-              <a:defRPr sz="2000"/>
+            <a:lvl8pPr marL="3779992" indent="0">
+              <a:buNone/>
+              <a:defRPr sz="1181"/>
             </a:lvl8pPr>
-            <a:lvl9pPr marL="3657600" indent="0">
-              <a:buNone/>
-              <a:defRPr sz="2000"/>
+            <a:lvl9pPr marL="4319991" indent="0">
+              <a:buNone/>
+              <a:defRPr sz="1181"/>
             </a:lvl9pPr>
           </a:lstStyle>
           <a:p>
-            <a:endParaRPr lang="en-US"/>
-          </a:p>
-        </p:txBody>
-      </p:sp>
-      <p:sp>
-        <p:nvSpPr>
-          <p:cNvPr id="4" name="Text Placeholder 3">
-            <a:extLst>
-              <a:ext uri="{FF2B5EF4-FFF2-40B4-BE49-F238E27FC236}">
-                <a16:creationId xmlns:a16="http://schemas.microsoft.com/office/drawing/2014/main" id="{2C3071F1-7153-467C-B2EA-4F797A97C1DC}"/>
-              </a:ext>
-            </a:extLst>
-          </p:cNvPr>
-          <p:cNvSpPr>
-            <a:spLocks noGrp="1"/>
-          </p:cNvSpPr>
-          <p:nvPr>
-            <p:ph type="body" sz="half" idx="2"/>
-          </p:nvPr>
-        </p:nvSpPr>
-        <p:spPr>
-          <a:xfrm>
-            <a:off x="839788" y="2057400"/>
-            <a:ext cx="3932237" cy="3811588"/>
-          </a:xfrm>
-        </p:spPr>
-        <p:txBody>
-          <a:bodyPr/>
-          <a:lstStyle>
-            <a:lvl1pPr marL="0" indent="0">
-              <a:buNone/>
-              <a:defRPr sz="1600"/>
-            </a:lvl1pPr>
-            <a:lvl2pPr marL="457200" indent="0">
-              <a:buNone/>
-              <a:defRPr sz="1400"/>
-            </a:lvl2pPr>
-            <a:lvl3pPr marL="914400" indent="0">
-              <a:buNone/>
-              <a:defRPr sz="1200"/>
-            </a:lvl3pPr>
-            <a:lvl4pPr marL="1371600" indent="0">
-              <a:buNone/>
-              <a:defRPr sz="1000"/>
-            </a:lvl4pPr>
-            <a:lvl5pPr marL="1828800" indent="0">
-              <a:buNone/>
-              <a:defRPr sz="1000"/>
-            </a:lvl5pPr>
-            <a:lvl6pPr marL="2286000" indent="0">
-              <a:buNone/>
-              <a:defRPr sz="1000"/>
-            </a:lvl6pPr>
-            <a:lvl7pPr marL="2743200" indent="0">
-              <a:buNone/>
-              <a:defRPr sz="1000"/>
-            </a:lvl7pPr>
-            <a:lvl8pPr marL="3200400" indent="0">
-              <a:buNone/>
-              <a:defRPr sz="1000"/>
-            </a:lvl8pPr>
-            <a:lvl9pPr marL="3657600" indent="0">
-              <a:buNone/>
-              <a:defRPr sz="1000"/>
-            </a:lvl9pPr>
-          </a:lstStyle>
-          <a:p>
             <a:pPr lvl="0"/>
             <a:r>
               <a:rPr lang="en-US"/>
@@ -2655,13 +2346,7 @@
       </p:sp>
       <p:sp>
         <p:nvSpPr>
-          <p:cNvPr id="5" name="Date Placeholder 4">
-            <a:extLst>
-              <a:ext uri="{FF2B5EF4-FFF2-40B4-BE49-F238E27FC236}">
-                <a16:creationId xmlns:a16="http://schemas.microsoft.com/office/drawing/2014/main" id="{7D0F50A5-E479-4235-A80F-74EC9421C3F6}"/>
-              </a:ext>
-            </a:extLst>
-          </p:cNvPr>
+          <p:cNvPr id="5" name="Date Placeholder 4"/>
           <p:cNvSpPr>
             <a:spLocks noGrp="1"/>
           </p:cNvSpPr>
@@ -2676,7 +2361,7 @@
           <a:p>
             <a:fld id="{2F0D3B1E-FCC1-4A5E-9AAF-BCC374D20566}" type="datetimeFigureOut">
               <a:rPr lang="en-US" smtClean="0"/>
-              <a:t>2021-03-05</a:t>
+              <a:t>2021-06-10</a:t>
             </a:fld>
             <a:endParaRPr lang="en-US"/>
           </a:p>
@@ -2684,13 +2369,7 @@
       </p:sp>
       <p:sp>
         <p:nvSpPr>
-          <p:cNvPr id="6" name="Footer Placeholder 5">
-            <a:extLst>
-              <a:ext uri="{FF2B5EF4-FFF2-40B4-BE49-F238E27FC236}">
-                <a16:creationId xmlns:a16="http://schemas.microsoft.com/office/drawing/2014/main" id="{16891956-DD5A-42C0-9174-80C3BF0C387A}"/>
-              </a:ext>
-            </a:extLst>
-          </p:cNvPr>
+          <p:cNvPr id="6" name="Footer Placeholder 5"/>
           <p:cNvSpPr>
             <a:spLocks noGrp="1"/>
           </p:cNvSpPr>
@@ -2709,13 +2388,7 @@
       </p:sp>
       <p:sp>
         <p:nvSpPr>
-          <p:cNvPr id="7" name="Slide Number Placeholder 6">
-            <a:extLst>
-              <a:ext uri="{FF2B5EF4-FFF2-40B4-BE49-F238E27FC236}">
-                <a16:creationId xmlns:a16="http://schemas.microsoft.com/office/drawing/2014/main" id="{28F899E9-D2D4-4B21-8780-1B8B7B7B9B4D}"/>
-              </a:ext>
-            </a:extLst>
-          </p:cNvPr>
+          <p:cNvPr id="7" name="Slide Number Placeholder 6"/>
           <p:cNvSpPr>
             <a:spLocks noGrp="1"/>
           </p:cNvSpPr>
@@ -2739,7 +2412,7 @@
     </p:spTree>
     <p:extLst>
       <p:ext uri="{BB962C8B-B14F-4D97-AF65-F5344CB8AC3E}">
-        <p14:creationId xmlns:p14="http://schemas.microsoft.com/office/powerpoint/2010/main" val="2867439730"/>
+        <p14:creationId xmlns:p14="http://schemas.microsoft.com/office/powerpoint/2010/main" val="1300329098"/>
       </p:ext>
     </p:extLst>
   </p:cSld>
@@ -2773,13 +2446,7 @@
       </p:grpSpPr>
       <p:sp>
         <p:nvSpPr>
-          <p:cNvPr id="2" name="Title Placeholder 1">
-            <a:extLst>
-              <a:ext uri="{FF2B5EF4-FFF2-40B4-BE49-F238E27FC236}">
-                <a16:creationId xmlns:a16="http://schemas.microsoft.com/office/drawing/2014/main" id="{D4412543-438F-4F10-A8EB-8B7439634810}"/>
-              </a:ext>
-            </a:extLst>
-          </p:cNvPr>
+          <p:cNvPr id="2" name="Title Placeholder 1"/>
           <p:cNvSpPr>
             <a:spLocks noGrp="1"/>
           </p:cNvSpPr>
@@ -2789,8 +2456,8 @@
         </p:nvSpPr>
         <p:spPr>
           <a:xfrm>
-            <a:off x="838200" y="365125"/>
-            <a:ext cx="10515600" cy="1325563"/>
+            <a:off x="742484" y="574990"/>
+            <a:ext cx="9314796" cy="2087455"/>
           </a:xfrm>
           <a:prstGeom prst="rect">
             <a:avLst/>
@@ -2806,18 +2473,13 @@
               <a:rPr lang="en-US"/>
               <a:t>Click to edit Master title style</a:t>
             </a:r>
-          </a:p>
-        </p:txBody>
-      </p:sp>
-      <p:sp>
-        <p:nvSpPr>
-          <p:cNvPr id="3" name="Text Placeholder 2">
-            <a:extLst>
-              <a:ext uri="{FF2B5EF4-FFF2-40B4-BE49-F238E27FC236}">
-                <a16:creationId xmlns:a16="http://schemas.microsoft.com/office/drawing/2014/main" id="{4C5A4A7F-476A-48B7-B14C-B37CA18228EC}"/>
-              </a:ext>
-            </a:extLst>
-          </p:cNvPr>
+            <a:endParaRPr lang="en-US" dirty="0"/>
+          </a:p>
+        </p:txBody>
+      </p:sp>
+      <p:sp>
+        <p:nvSpPr>
+          <p:cNvPr id="3" name="Text Placeholder 2"/>
           <p:cNvSpPr>
             <a:spLocks noGrp="1"/>
           </p:cNvSpPr>
@@ -2827,8 +2489,8 @@
         </p:nvSpPr>
         <p:spPr>
           <a:xfrm>
-            <a:off x="838200" y="1825625"/>
-            <a:ext cx="10515600" cy="4351338"/>
+            <a:off x="742484" y="2874937"/>
+            <a:ext cx="9314796" cy="6852350"/>
           </a:xfrm>
           <a:prstGeom prst="rect">
             <a:avLst/>
@@ -2873,18 +2535,13 @@
               <a:rPr lang="en-US"/>
               <a:t>Fifth level</a:t>
             </a:r>
-          </a:p>
-        </p:txBody>
-      </p:sp>
-      <p:sp>
-        <p:nvSpPr>
-          <p:cNvPr id="4" name="Date Placeholder 3">
-            <a:extLst>
-              <a:ext uri="{FF2B5EF4-FFF2-40B4-BE49-F238E27FC236}">
-                <a16:creationId xmlns:a16="http://schemas.microsoft.com/office/drawing/2014/main" id="{E9A2825B-EB72-4721-A60B-146878F43B2B}"/>
-              </a:ext>
-            </a:extLst>
-          </p:cNvPr>
+            <a:endParaRPr lang="en-US" dirty="0"/>
+          </a:p>
+        </p:txBody>
+      </p:sp>
+      <p:sp>
+        <p:nvSpPr>
+          <p:cNvPr id="4" name="Date Placeholder 3"/>
           <p:cNvSpPr>
             <a:spLocks noGrp="1"/>
           </p:cNvSpPr>
@@ -2894,8 +2551,8 @@
         </p:nvSpPr>
         <p:spPr>
           <a:xfrm>
-            <a:off x="838200" y="6356350"/>
-            <a:ext cx="2743200" cy="365125"/>
+            <a:off x="742484" y="10009783"/>
+            <a:ext cx="2429947" cy="574987"/>
           </a:xfrm>
           <a:prstGeom prst="rect">
             <a:avLst/>
@@ -2905,7 +2562,7 @@
           <a:bodyPr vert="horz" lIns="91440" tIns="45720" rIns="91440" bIns="45720" rtlCol="0" anchor="ctr"/>
           <a:lstStyle>
             <a:lvl1pPr algn="l">
-              <a:defRPr sz="1200">
+              <a:defRPr sz="1417">
                 <a:solidFill>
                   <a:schemeClr val="tx1">
                     <a:tint val="75000"/>
@@ -2917,7 +2574,7 @@
           <a:p>
             <a:fld id="{2F0D3B1E-FCC1-4A5E-9AAF-BCC374D20566}" type="datetimeFigureOut">
               <a:rPr lang="en-US" smtClean="0"/>
-              <a:t>2021-03-05</a:t>
+              <a:t>2021-06-10</a:t>
             </a:fld>
             <a:endParaRPr lang="en-US"/>
           </a:p>
@@ -2925,13 +2582,7 @@
       </p:sp>
       <p:sp>
         <p:nvSpPr>
-          <p:cNvPr id="5" name="Footer Placeholder 4">
-            <a:extLst>
-              <a:ext uri="{FF2B5EF4-FFF2-40B4-BE49-F238E27FC236}">
-                <a16:creationId xmlns:a16="http://schemas.microsoft.com/office/drawing/2014/main" id="{0BE32C4A-408F-40CD-B885-3636181FBDAA}"/>
-              </a:ext>
-            </a:extLst>
-          </p:cNvPr>
+          <p:cNvPr id="5" name="Footer Placeholder 4"/>
           <p:cNvSpPr>
             <a:spLocks noGrp="1"/>
           </p:cNvSpPr>
@@ -2941,8 +2592,8 @@
         </p:nvSpPr>
         <p:spPr>
           <a:xfrm>
-            <a:off x="4038600" y="6356350"/>
-            <a:ext cx="4114800" cy="365125"/>
+            <a:off x="3577422" y="10009783"/>
+            <a:ext cx="3644920" cy="574987"/>
           </a:xfrm>
           <a:prstGeom prst="rect">
             <a:avLst/>
@@ -2952,7 +2603,7 @@
           <a:bodyPr vert="horz" lIns="91440" tIns="45720" rIns="91440" bIns="45720" rtlCol="0" anchor="ctr"/>
           <a:lstStyle>
             <a:lvl1pPr algn="ctr">
-              <a:defRPr sz="1200">
+              <a:defRPr sz="1417">
                 <a:solidFill>
                   <a:schemeClr val="tx1">
                     <a:tint val="75000"/>
@@ -2968,13 +2619,7 @@
       </p:sp>
       <p:sp>
         <p:nvSpPr>
-          <p:cNvPr id="6" name="Slide Number Placeholder 5">
-            <a:extLst>
-              <a:ext uri="{FF2B5EF4-FFF2-40B4-BE49-F238E27FC236}">
-                <a16:creationId xmlns:a16="http://schemas.microsoft.com/office/drawing/2014/main" id="{67493F11-55DB-46BA-828C-74043F9D081D}"/>
-              </a:ext>
-            </a:extLst>
-          </p:cNvPr>
+          <p:cNvPr id="6" name="Slide Number Placeholder 5"/>
           <p:cNvSpPr>
             <a:spLocks noGrp="1"/>
           </p:cNvSpPr>
@@ -2984,8 +2629,8 @@
         </p:nvSpPr>
         <p:spPr>
           <a:xfrm>
-            <a:off x="8610600" y="6356350"/>
-            <a:ext cx="2743200" cy="365125"/>
+            <a:off x="7627332" y="10009783"/>
+            <a:ext cx="2429947" cy="574987"/>
           </a:xfrm>
           <a:prstGeom prst="rect">
             <a:avLst/>
@@ -2995,7 +2640,7 @@
           <a:bodyPr vert="horz" lIns="91440" tIns="45720" rIns="91440" bIns="45720" rtlCol="0" anchor="ctr"/>
           <a:lstStyle>
             <a:lvl1pPr algn="r">
-              <a:defRPr sz="1200">
+              <a:defRPr sz="1417">
                 <a:solidFill>
                   <a:schemeClr val="tx1">
                     <a:tint val="75000"/>
@@ -3016,27 +2661,27 @@
     </p:spTree>
     <p:extLst>
       <p:ext uri="{BB962C8B-B14F-4D97-AF65-F5344CB8AC3E}">
-        <p14:creationId xmlns:p14="http://schemas.microsoft.com/office/powerpoint/2010/main" val="2912978594"/>
+        <p14:creationId xmlns:p14="http://schemas.microsoft.com/office/powerpoint/2010/main" val="543718442"/>
       </p:ext>
     </p:extLst>
   </p:cSld>
   <p:clrMap bg1="lt1" tx1="dk1" bg2="lt2" tx2="dk2" accent1="accent1" accent2="accent2" accent3="accent3" accent4="accent4" accent5="accent5" accent6="accent6" hlink="hlink" folHlink="folHlink"/>
   <p:sldLayoutIdLst>
-    <p:sldLayoutId id="2147483649" r:id="rId1"/>
-    <p:sldLayoutId id="2147483650" r:id="rId2"/>
-    <p:sldLayoutId id="2147483651" r:id="rId3"/>
-    <p:sldLayoutId id="2147483652" r:id="rId4"/>
-    <p:sldLayoutId id="2147483653" r:id="rId5"/>
-    <p:sldLayoutId id="2147483654" r:id="rId6"/>
-    <p:sldLayoutId id="2147483655" r:id="rId7"/>
-    <p:sldLayoutId id="2147483656" r:id="rId8"/>
-    <p:sldLayoutId id="2147483657" r:id="rId9"/>
-    <p:sldLayoutId id="2147483658" r:id="rId10"/>
-    <p:sldLayoutId id="2147483659" r:id="rId11"/>
+    <p:sldLayoutId id="2147483661" r:id="rId1"/>
+    <p:sldLayoutId id="2147483662" r:id="rId2"/>
+    <p:sldLayoutId id="2147483663" r:id="rId3"/>
+    <p:sldLayoutId id="2147483664" r:id="rId4"/>
+    <p:sldLayoutId id="2147483665" r:id="rId5"/>
+    <p:sldLayoutId id="2147483666" r:id="rId6"/>
+    <p:sldLayoutId id="2147483667" r:id="rId7"/>
+    <p:sldLayoutId id="2147483668" r:id="rId8"/>
+    <p:sldLayoutId id="2147483669" r:id="rId9"/>
+    <p:sldLayoutId id="2147483670" r:id="rId10"/>
+    <p:sldLayoutId id="2147483671" r:id="rId11"/>
   </p:sldLayoutIdLst>
   <p:txStyles>
     <p:titleStyle>
-      <a:lvl1pPr algn="l" defTabSz="914400" rtl="0" eaLnBrk="1" latinLnBrk="0" hangingPunct="1">
+      <a:lvl1pPr algn="l" defTabSz="1079998" rtl="0" eaLnBrk="1" latinLnBrk="0" hangingPunct="1">
         <a:lnSpc>
           <a:spcPct val="90000"/>
         </a:lnSpc>
@@ -3044,7 +2689,7 @@
           <a:spcPct val="0"/>
         </a:spcBef>
         <a:buNone/>
-        <a:defRPr sz="4400" kern="1200">
+        <a:defRPr sz="5197" kern="1200">
           <a:solidFill>
             <a:schemeClr val="tx1"/>
           </a:solidFill>
@@ -3055,16 +2700,16 @@
       </a:lvl1pPr>
     </p:titleStyle>
     <p:bodyStyle>
-      <a:lvl1pPr marL="228600" indent="-228600" algn="l" defTabSz="914400" rtl="0" eaLnBrk="1" latinLnBrk="0" hangingPunct="1">
+      <a:lvl1pPr marL="269999" indent="-269999" algn="l" defTabSz="1079998" rtl="0" eaLnBrk="1" latinLnBrk="0" hangingPunct="1">
         <a:lnSpc>
           <a:spcPct val="90000"/>
         </a:lnSpc>
         <a:spcBef>
-          <a:spcPts val="1000"/>
+          <a:spcPts val="1181"/>
         </a:spcBef>
         <a:buFont typeface="Arial" panose="020B0604020202020204" pitchFamily="34" charset="0"/>
         <a:buChar char="•"/>
-        <a:defRPr sz="2800" kern="1200">
+        <a:defRPr sz="3307" kern="1200">
           <a:solidFill>
             <a:schemeClr val="tx1"/>
           </a:solidFill>
@@ -3073,16 +2718,16 @@
           <a:cs typeface="+mn-cs"/>
         </a:defRPr>
       </a:lvl1pPr>
-      <a:lvl2pPr marL="685800" indent="-228600" algn="l" defTabSz="914400" rtl="0" eaLnBrk="1" latinLnBrk="0" hangingPunct="1">
+      <a:lvl2pPr marL="809998" indent="-269999" algn="l" defTabSz="1079998" rtl="0" eaLnBrk="1" latinLnBrk="0" hangingPunct="1">
         <a:lnSpc>
           <a:spcPct val="90000"/>
         </a:lnSpc>
         <a:spcBef>
-          <a:spcPts val="500"/>
+          <a:spcPts val="591"/>
         </a:spcBef>
         <a:buFont typeface="Arial" panose="020B0604020202020204" pitchFamily="34" charset="0"/>
         <a:buChar char="•"/>
-        <a:defRPr sz="2400" kern="1200">
+        <a:defRPr sz="2835" kern="1200">
           <a:solidFill>
             <a:schemeClr val="tx1"/>
           </a:solidFill>
@@ -3091,16 +2736,16 @@
           <a:cs typeface="+mn-cs"/>
         </a:defRPr>
       </a:lvl2pPr>
-      <a:lvl3pPr marL="1143000" indent="-228600" algn="l" defTabSz="914400" rtl="0" eaLnBrk="1" latinLnBrk="0" hangingPunct="1">
+      <a:lvl3pPr marL="1349997" indent="-269999" algn="l" defTabSz="1079998" rtl="0" eaLnBrk="1" latinLnBrk="0" hangingPunct="1">
         <a:lnSpc>
           <a:spcPct val="90000"/>
         </a:lnSpc>
         <a:spcBef>
-          <a:spcPts val="500"/>
+          <a:spcPts val="591"/>
         </a:spcBef>
         <a:buFont typeface="Arial" panose="020B0604020202020204" pitchFamily="34" charset="0"/>
         <a:buChar char="•"/>
-        <a:defRPr sz="2000" kern="1200">
+        <a:defRPr sz="2362" kern="1200">
           <a:solidFill>
             <a:schemeClr val="tx1"/>
           </a:solidFill>
@@ -3109,16 +2754,16 @@
           <a:cs typeface="+mn-cs"/>
         </a:defRPr>
       </a:lvl3pPr>
-      <a:lvl4pPr marL="1600200" indent="-228600" algn="l" defTabSz="914400" rtl="0" eaLnBrk="1" latinLnBrk="0" hangingPunct="1">
+      <a:lvl4pPr marL="1889996" indent="-269999" algn="l" defTabSz="1079998" rtl="0" eaLnBrk="1" latinLnBrk="0" hangingPunct="1">
         <a:lnSpc>
           <a:spcPct val="90000"/>
         </a:lnSpc>
         <a:spcBef>
-          <a:spcPts val="500"/>
+          <a:spcPts val="591"/>
         </a:spcBef>
         <a:buFont typeface="Arial" panose="020B0604020202020204" pitchFamily="34" charset="0"/>
         <a:buChar char="•"/>
-        <a:defRPr sz="1800" kern="1200">
+        <a:defRPr sz="2126" kern="1200">
           <a:solidFill>
             <a:schemeClr val="tx1"/>
           </a:solidFill>
@@ -3127,16 +2772,16 @@
           <a:cs typeface="+mn-cs"/>
         </a:defRPr>
       </a:lvl4pPr>
-      <a:lvl5pPr marL="2057400" indent="-228600" algn="l" defTabSz="914400" rtl="0" eaLnBrk="1" latinLnBrk="0" hangingPunct="1">
+      <a:lvl5pPr marL="2429995" indent="-269999" algn="l" defTabSz="1079998" rtl="0" eaLnBrk="1" latinLnBrk="0" hangingPunct="1">
         <a:lnSpc>
           <a:spcPct val="90000"/>
         </a:lnSpc>
         <a:spcBef>
-          <a:spcPts val="500"/>
+          <a:spcPts val="591"/>
         </a:spcBef>
         <a:buFont typeface="Arial" panose="020B0604020202020204" pitchFamily="34" charset="0"/>
         <a:buChar char="•"/>
-        <a:defRPr sz="1800" kern="1200">
+        <a:defRPr sz="2126" kern="1200">
           <a:solidFill>
             <a:schemeClr val="tx1"/>
           </a:solidFill>
@@ -3145,16 +2790,16 @@
           <a:cs typeface="+mn-cs"/>
         </a:defRPr>
       </a:lvl5pPr>
-      <a:lvl6pPr marL="2514600" indent="-228600" algn="l" defTabSz="914400" rtl="0" eaLnBrk="1" latinLnBrk="0" hangingPunct="1">
+      <a:lvl6pPr marL="2969994" indent="-269999" algn="l" defTabSz="1079998" rtl="0" eaLnBrk="1" latinLnBrk="0" hangingPunct="1">
         <a:lnSpc>
           <a:spcPct val="90000"/>
         </a:lnSpc>
         <a:spcBef>
-          <a:spcPts val="500"/>
+          <a:spcPts val="591"/>
         </a:spcBef>
         <a:buFont typeface="Arial" panose="020B0604020202020204" pitchFamily="34" charset="0"/>
         <a:buChar char="•"/>
-        <a:defRPr sz="1800" kern="1200">
+        <a:defRPr sz="2126" kern="1200">
           <a:solidFill>
             <a:schemeClr val="tx1"/>
           </a:solidFill>
@@ -3163,16 +2808,16 @@
           <a:cs typeface="+mn-cs"/>
         </a:defRPr>
       </a:lvl6pPr>
-      <a:lvl7pPr marL="2971800" indent="-228600" algn="l" defTabSz="914400" rtl="0" eaLnBrk="1" latinLnBrk="0" hangingPunct="1">
+      <a:lvl7pPr marL="3509993" indent="-269999" algn="l" defTabSz="1079998" rtl="0" eaLnBrk="1" latinLnBrk="0" hangingPunct="1">
         <a:lnSpc>
           <a:spcPct val="90000"/>
         </a:lnSpc>
         <a:spcBef>
-          <a:spcPts val="500"/>
+          <a:spcPts val="591"/>
         </a:spcBef>
         <a:buFont typeface="Arial" panose="020B0604020202020204" pitchFamily="34" charset="0"/>
         <a:buChar char="•"/>
-        <a:defRPr sz="1800" kern="1200">
+        <a:defRPr sz="2126" kern="1200">
           <a:solidFill>
             <a:schemeClr val="tx1"/>
           </a:solidFill>
@@ -3181,16 +2826,16 @@
           <a:cs typeface="+mn-cs"/>
         </a:defRPr>
       </a:lvl7pPr>
-      <a:lvl8pPr marL="3429000" indent="-228600" algn="l" defTabSz="914400" rtl="0" eaLnBrk="1" latinLnBrk="0" hangingPunct="1">
+      <a:lvl8pPr marL="4049992" indent="-269999" algn="l" defTabSz="1079998" rtl="0" eaLnBrk="1" latinLnBrk="0" hangingPunct="1">
         <a:lnSpc>
           <a:spcPct val="90000"/>
         </a:lnSpc>
         <a:spcBef>
-          <a:spcPts val="500"/>
+          <a:spcPts val="591"/>
         </a:spcBef>
         <a:buFont typeface="Arial" panose="020B0604020202020204" pitchFamily="34" charset="0"/>
         <a:buChar char="•"/>
-        <a:defRPr sz="1800" kern="1200">
+        <a:defRPr sz="2126" kern="1200">
           <a:solidFill>
             <a:schemeClr val="tx1"/>
           </a:solidFill>
@@ -3199,16 +2844,16 @@
           <a:cs typeface="+mn-cs"/>
         </a:defRPr>
       </a:lvl8pPr>
-      <a:lvl9pPr marL="3886200" indent="-228600" algn="l" defTabSz="914400" rtl="0" eaLnBrk="1" latinLnBrk="0" hangingPunct="1">
+      <a:lvl9pPr marL="4589991" indent="-269999" algn="l" defTabSz="1079998" rtl="0" eaLnBrk="1" latinLnBrk="0" hangingPunct="1">
         <a:lnSpc>
           <a:spcPct val="90000"/>
         </a:lnSpc>
         <a:spcBef>
-          <a:spcPts val="500"/>
+          <a:spcPts val="591"/>
         </a:spcBef>
         <a:buFont typeface="Arial" panose="020B0604020202020204" pitchFamily="34" charset="0"/>
         <a:buChar char="•"/>
-        <a:defRPr sz="1800" kern="1200">
+        <a:defRPr sz="2126" kern="1200">
           <a:solidFill>
             <a:schemeClr val="tx1"/>
           </a:solidFill>
@@ -3222,8 +2867,8 @@
       <a:defPPr>
         <a:defRPr lang="en-US"/>
       </a:defPPr>
-      <a:lvl1pPr marL="0" algn="l" defTabSz="914400" rtl="0" eaLnBrk="1" latinLnBrk="0" hangingPunct="1">
-        <a:defRPr sz="1800" kern="1200">
+      <a:lvl1pPr marL="0" algn="l" defTabSz="1079998" rtl="0" eaLnBrk="1" latinLnBrk="0" hangingPunct="1">
+        <a:defRPr sz="2126" kern="1200">
           <a:solidFill>
             <a:schemeClr val="tx1"/>
           </a:solidFill>
@@ -3232,8 +2877,8 @@
           <a:cs typeface="+mn-cs"/>
         </a:defRPr>
       </a:lvl1pPr>
-      <a:lvl2pPr marL="457200" algn="l" defTabSz="914400" rtl="0" eaLnBrk="1" latinLnBrk="0" hangingPunct="1">
-        <a:defRPr sz="1800" kern="1200">
+      <a:lvl2pPr marL="539999" algn="l" defTabSz="1079998" rtl="0" eaLnBrk="1" latinLnBrk="0" hangingPunct="1">
+        <a:defRPr sz="2126" kern="1200">
           <a:solidFill>
             <a:schemeClr val="tx1"/>
           </a:solidFill>
@@ -3242,8 +2887,8 @@
           <a:cs typeface="+mn-cs"/>
         </a:defRPr>
       </a:lvl2pPr>
-      <a:lvl3pPr marL="914400" algn="l" defTabSz="914400" rtl="0" eaLnBrk="1" latinLnBrk="0" hangingPunct="1">
-        <a:defRPr sz="1800" kern="1200">
+      <a:lvl3pPr marL="1079998" algn="l" defTabSz="1079998" rtl="0" eaLnBrk="1" latinLnBrk="0" hangingPunct="1">
+        <a:defRPr sz="2126" kern="1200">
           <a:solidFill>
             <a:schemeClr val="tx1"/>
           </a:solidFill>
@@ -3252,8 +2897,8 @@
           <a:cs typeface="+mn-cs"/>
         </a:defRPr>
       </a:lvl3pPr>
-      <a:lvl4pPr marL="1371600" algn="l" defTabSz="914400" rtl="0" eaLnBrk="1" latinLnBrk="0" hangingPunct="1">
-        <a:defRPr sz="1800" kern="1200">
+      <a:lvl4pPr marL="1619997" algn="l" defTabSz="1079998" rtl="0" eaLnBrk="1" latinLnBrk="0" hangingPunct="1">
+        <a:defRPr sz="2126" kern="1200">
           <a:solidFill>
             <a:schemeClr val="tx1"/>
           </a:solidFill>
@@ -3262,8 +2907,8 @@
           <a:cs typeface="+mn-cs"/>
         </a:defRPr>
       </a:lvl4pPr>
-      <a:lvl5pPr marL="1828800" algn="l" defTabSz="914400" rtl="0" eaLnBrk="1" latinLnBrk="0" hangingPunct="1">
-        <a:defRPr sz="1800" kern="1200">
+      <a:lvl5pPr marL="2159996" algn="l" defTabSz="1079998" rtl="0" eaLnBrk="1" latinLnBrk="0" hangingPunct="1">
+        <a:defRPr sz="2126" kern="1200">
           <a:solidFill>
             <a:schemeClr val="tx1"/>
           </a:solidFill>
@@ -3272,8 +2917,8 @@
           <a:cs typeface="+mn-cs"/>
         </a:defRPr>
       </a:lvl5pPr>
-      <a:lvl6pPr marL="2286000" algn="l" defTabSz="914400" rtl="0" eaLnBrk="1" latinLnBrk="0" hangingPunct="1">
-        <a:defRPr sz="1800" kern="1200">
+      <a:lvl6pPr marL="2699995" algn="l" defTabSz="1079998" rtl="0" eaLnBrk="1" latinLnBrk="0" hangingPunct="1">
+        <a:defRPr sz="2126" kern="1200">
           <a:solidFill>
             <a:schemeClr val="tx1"/>
           </a:solidFill>
@@ -3282,8 +2927,8 @@
           <a:cs typeface="+mn-cs"/>
         </a:defRPr>
       </a:lvl6pPr>
-      <a:lvl7pPr marL="2743200" algn="l" defTabSz="914400" rtl="0" eaLnBrk="1" latinLnBrk="0" hangingPunct="1">
-        <a:defRPr sz="1800" kern="1200">
+      <a:lvl7pPr marL="3239994" algn="l" defTabSz="1079998" rtl="0" eaLnBrk="1" latinLnBrk="0" hangingPunct="1">
+        <a:defRPr sz="2126" kern="1200">
           <a:solidFill>
             <a:schemeClr val="tx1"/>
           </a:solidFill>
@@ -3292,8 +2937,8 @@
           <a:cs typeface="+mn-cs"/>
         </a:defRPr>
       </a:lvl7pPr>
-      <a:lvl8pPr marL="3200400" algn="l" defTabSz="914400" rtl="0" eaLnBrk="1" latinLnBrk="0" hangingPunct="1">
-        <a:defRPr sz="1800" kern="1200">
+      <a:lvl8pPr marL="3779992" algn="l" defTabSz="1079998" rtl="0" eaLnBrk="1" latinLnBrk="0" hangingPunct="1">
+        <a:defRPr sz="2126" kern="1200">
           <a:solidFill>
             <a:schemeClr val="tx1"/>
           </a:solidFill>
@@ -3302,8 +2947,8 @@
           <a:cs typeface="+mn-cs"/>
         </a:defRPr>
       </a:lvl8pPr>
-      <a:lvl9pPr marL="3657600" algn="l" defTabSz="914400" rtl="0" eaLnBrk="1" latinLnBrk="0" hangingPunct="1">
-        <a:defRPr sz="1800" kern="1200">
+      <a:lvl9pPr marL="4319991" algn="l" defTabSz="1079998" rtl="0" eaLnBrk="1" latinLnBrk="0" hangingPunct="1">
+        <a:defRPr sz="2126" kern="1200">
           <a:solidFill>
             <a:schemeClr val="tx1"/>
           </a:solidFill>
@@ -3356,8 +3001,8 @@
         </p:blipFill>
         <p:spPr>
           <a:xfrm>
-            <a:off x="1976420" y="323400"/>
-            <a:ext cx="8386780" cy="6211200"/>
+            <a:off x="1750727" y="2648918"/>
+            <a:ext cx="7429071" cy="5501926"/>
           </a:xfrm>
           <a:prstGeom prst="rect">
             <a:avLst/>
@@ -3378,8 +3023,8 @@
         </p:nvSpPr>
         <p:spPr>
           <a:xfrm>
-            <a:off x="2303092" y="911577"/>
-            <a:ext cx="1943100" cy="1866900"/>
+            <a:off x="2040096" y="3169929"/>
+            <a:ext cx="1721212" cy="1653714"/>
           </a:xfrm>
           <a:prstGeom prst="rect">
             <a:avLst/>
@@ -3417,7 +3062,7 @@
           <a:p>
             <a:pPr algn="ctr"/>
             <a:r>
-              <a:rPr lang="de-DE">
+              <a:rPr lang="de-DE" sz="1594">
                 <a:solidFill>
                   <a:schemeClr val="bg1">
                     <a:lumMod val="50000"/>
@@ -3428,7 +3073,7 @@
               <a:t>Regeln</a:t>
             </a:r>
             <a:br>
-              <a:rPr lang="de-DE">
+              <a:rPr lang="de-DE" sz="1594">
                 <a:solidFill>
                   <a:schemeClr val="bg1">
                     <a:lumMod val="50000"/>
@@ -3438,7 +3083,7 @@
               </a:rPr>
             </a:br>
             <a:r>
-              <a:rPr lang="de-DE">
+              <a:rPr lang="de-DE" sz="1594">
                 <a:solidFill>
                   <a:schemeClr val="bg1">
                     <a:lumMod val="50000"/>
@@ -3448,7 +3093,7 @@
               </a:rPr>
               <a:t>(formelle)</a:t>
             </a:r>
-            <a:endParaRPr lang="en-US">
+            <a:endParaRPr lang="en-US" sz="1594">
               <a:solidFill>
                 <a:schemeClr val="bg1">
                   <a:lumMod val="50000"/>
@@ -3473,8 +3118,8 @@
         </p:nvSpPr>
         <p:spPr>
           <a:xfrm>
-            <a:off x="4246192" y="911577"/>
-            <a:ext cx="1943100" cy="1866900"/>
+            <a:off x="3761308" y="3169929"/>
+            <a:ext cx="1721212" cy="1653714"/>
           </a:xfrm>
           <a:prstGeom prst="rect">
             <a:avLst/>
@@ -3512,7 +3157,7 @@
           <a:p>
             <a:pPr algn="ctr"/>
             <a:r>
-              <a:rPr lang="de-DE">
+              <a:rPr lang="de-DE" sz="1594">
                 <a:solidFill>
                   <a:schemeClr val="bg1">
                     <a:lumMod val="50000"/>
@@ -3523,7 +3168,7 @@
               <a:t>Menschen + Ideen</a:t>
             </a:r>
             <a:br>
-              <a:rPr lang="de-DE">
+              <a:rPr lang="de-DE" sz="1594">
                 <a:solidFill>
                   <a:schemeClr val="bg1">
                     <a:lumMod val="50000"/>
@@ -3533,7 +3178,7 @@
               </a:rPr>
             </a:br>
             <a:r>
-              <a:rPr lang="de-DE">
+              <a:rPr lang="de-DE" sz="1594">
                 <a:solidFill>
                   <a:schemeClr val="bg1">
                     <a:lumMod val="50000"/>
@@ -3543,7 +3188,7 @@
               </a:rPr>
               <a:t>(semi-formal)</a:t>
             </a:r>
-            <a:endParaRPr lang="en-US">
+            <a:endParaRPr lang="en-US" sz="1594">
               <a:solidFill>
                 <a:schemeClr val="bg1">
                   <a:lumMod val="50000"/>
@@ -3568,8 +3213,8 @@
         </p:nvSpPr>
         <p:spPr>
           <a:xfrm>
-            <a:off x="6190977" y="911577"/>
-            <a:ext cx="1943100" cy="1866900"/>
+            <a:off x="5484012" y="3169929"/>
+            <a:ext cx="1721212" cy="1653714"/>
           </a:xfrm>
           <a:prstGeom prst="rect">
             <a:avLst/>
@@ -3607,7 +3252,7 @@
           <a:p>
             <a:pPr algn="ctr"/>
             <a:r>
-              <a:rPr lang="de-DE">
+              <a:rPr lang="de-DE" sz="1594">
                 <a:solidFill>
                   <a:schemeClr val="bg1">
                     <a:lumMod val="50000"/>
@@ -3618,7 +3263,7 @@
               <a:t>Ideen </a:t>
             </a:r>
             <a:br>
-              <a:rPr lang="de-DE">
+              <a:rPr lang="de-DE" sz="1594">
                 <a:solidFill>
                   <a:schemeClr val="bg1">
                     <a:lumMod val="50000"/>
@@ -3628,7 +3273,7 @@
               </a:rPr>
             </a:br>
             <a:r>
-              <a:rPr lang="de-DE">
+              <a:rPr lang="de-DE" sz="1594">
                 <a:solidFill>
                   <a:schemeClr val="bg1">
                     <a:lumMod val="50000"/>
@@ -3639,7 +3284,7 @@
               <a:t>(Zukunft)</a:t>
             </a:r>
             <a:br>
-              <a:rPr lang="de-DE">
+              <a:rPr lang="de-DE" sz="1594">
                 <a:solidFill>
                   <a:schemeClr val="bg1">
                     <a:lumMod val="50000"/>
@@ -3649,7 +3294,7 @@
               </a:rPr>
             </a:br>
             <a:r>
-              <a:rPr lang="de-DE">
+              <a:rPr lang="de-DE" sz="1594">
                 <a:solidFill>
                   <a:schemeClr val="bg1">
                     <a:lumMod val="50000"/>
@@ -3659,7 +3304,7 @@
               </a:rPr>
               <a:t>(formal)</a:t>
             </a:r>
-            <a:endParaRPr lang="en-US">
+            <a:endParaRPr lang="en-US" sz="1594">
               <a:solidFill>
                 <a:schemeClr val="bg1">
                   <a:lumMod val="50000"/>
@@ -3684,8 +3329,8 @@
         </p:nvSpPr>
         <p:spPr>
           <a:xfrm>
-            <a:off x="8134077" y="911577"/>
-            <a:ext cx="1943100" cy="1866900"/>
+            <a:off x="7205225" y="3169929"/>
+            <a:ext cx="1721212" cy="1653714"/>
           </a:xfrm>
           <a:prstGeom prst="rect">
             <a:avLst/>
@@ -3723,7 +3368,7 @@
           <a:p>
             <a:pPr algn="ctr"/>
             <a:r>
-              <a:rPr lang="de-DE">
+              <a:rPr lang="de-DE" sz="1594">
                 <a:solidFill>
                   <a:schemeClr val="bg1">
                     <a:lumMod val="50000"/>
@@ -3734,7 +3379,7 @@
               <a:t>Menschen</a:t>
             </a:r>
             <a:br>
-              <a:rPr lang="de-DE">
+              <a:rPr lang="de-DE" sz="1594">
                 <a:solidFill>
                   <a:schemeClr val="bg1">
                     <a:lumMod val="50000"/>
@@ -3744,7 +3389,7 @@
               </a:rPr>
             </a:br>
             <a:r>
-              <a:rPr lang="de-DE">
+              <a:rPr lang="de-DE" sz="1594">
                 <a:solidFill>
                   <a:schemeClr val="bg1">
                     <a:lumMod val="50000"/>
@@ -3754,7 +3399,7 @@
               </a:rPr>
               <a:t>(extern)</a:t>
             </a:r>
-            <a:endParaRPr lang="en-US">
+            <a:endParaRPr lang="en-US" sz="1594">
               <a:solidFill>
                 <a:schemeClr val="bg1">
                   <a:lumMod val="50000"/>
@@ -3779,8 +3424,8 @@
         </p:nvSpPr>
         <p:spPr>
           <a:xfrm>
-            <a:off x="2303092" y="2789638"/>
-            <a:ext cx="1943100" cy="1866900"/>
+            <a:off x="2040096" y="4833529"/>
+            <a:ext cx="1721212" cy="1653714"/>
           </a:xfrm>
           <a:prstGeom prst="rect">
             <a:avLst/>
@@ -3818,7 +3463,7 @@
           <a:p>
             <a:pPr algn="ctr"/>
             <a:r>
-              <a:rPr lang="de-DE">
+              <a:rPr lang="de-DE" sz="1594">
                 <a:solidFill>
                   <a:schemeClr val="bg1">
                     <a:lumMod val="50000"/>
@@ -3828,7 +3473,7 @@
               </a:rPr>
               <a:t>Dinge, Werkzeuge</a:t>
             </a:r>
-            <a:endParaRPr lang="en-US">
+            <a:endParaRPr lang="en-US" sz="1594">
               <a:solidFill>
                 <a:schemeClr val="bg1">
                   <a:lumMod val="50000"/>
@@ -3853,8 +3498,8 @@
         </p:nvSpPr>
         <p:spPr>
           <a:xfrm>
-            <a:off x="4246192" y="2789638"/>
-            <a:ext cx="1943100" cy="1866900"/>
+            <a:off x="3761308" y="4833529"/>
+            <a:ext cx="1721212" cy="1653714"/>
           </a:xfrm>
           <a:prstGeom prst="rect">
             <a:avLst/>
@@ -3892,7 +3537,7 @@
           <a:p>
             <a:pPr algn="ctr"/>
             <a:r>
-              <a:rPr lang="de-DE">
+              <a:rPr lang="de-DE" sz="1594">
                 <a:solidFill>
                   <a:schemeClr val="bg1">
                     <a:lumMod val="50000"/>
@@ -3903,7 +3548,7 @@
               <a:t>Menschen</a:t>
             </a:r>
             <a:br>
-              <a:rPr lang="de-DE">
+              <a:rPr lang="de-DE" sz="1594">
                 <a:solidFill>
                   <a:schemeClr val="bg1">
                     <a:lumMod val="50000"/>
@@ -3913,7 +3558,7 @@
               </a:rPr>
             </a:br>
             <a:r>
-              <a:rPr lang="de-DE">
+              <a:rPr lang="de-DE" sz="1594">
                 <a:solidFill>
                   <a:schemeClr val="bg1">
                     <a:lumMod val="50000"/>
@@ -3924,7 +3569,7 @@
               <a:t>(Zukunft)</a:t>
             </a:r>
             <a:br>
-              <a:rPr lang="de-DE">
+              <a:rPr lang="de-DE" sz="1594">
                 <a:solidFill>
                   <a:schemeClr val="bg1">
                     <a:lumMod val="50000"/>
@@ -3934,7 +3579,7 @@
               </a:rPr>
             </a:br>
             <a:r>
-              <a:rPr lang="de-DE">
+              <a:rPr lang="de-DE" sz="1594">
                 <a:solidFill>
                   <a:schemeClr val="bg1">
                     <a:lumMod val="50000"/>
@@ -3944,7 +3589,7 @@
               </a:rPr>
               <a:t>(semi-formal)</a:t>
             </a:r>
-            <a:endParaRPr lang="en-US">
+            <a:endParaRPr lang="en-US" sz="1594">
               <a:solidFill>
                 <a:schemeClr val="bg1">
                   <a:lumMod val="50000"/>
@@ -3969,8 +3614,8 @@
         </p:nvSpPr>
         <p:spPr>
           <a:xfrm>
-            <a:off x="6190977" y="2789638"/>
-            <a:ext cx="1943100" cy="1866900"/>
+            <a:off x="5484012" y="4833529"/>
+            <a:ext cx="1721212" cy="1653714"/>
           </a:xfrm>
           <a:prstGeom prst="rect">
             <a:avLst/>
@@ -4008,7 +3653,7 @@
           <a:p>
             <a:pPr algn="ctr"/>
             <a:r>
-              <a:rPr lang="de-DE">
+              <a:rPr lang="de-DE" sz="1594">
                 <a:solidFill>
                   <a:schemeClr val="bg1">
                     <a:lumMod val="50000"/>
@@ -4019,7 +3664,7 @@
               <a:t>Ideen / Werte</a:t>
             </a:r>
             <a:br>
-              <a:rPr lang="de-DE">
+              <a:rPr lang="de-DE" sz="1594">
                 <a:solidFill>
                   <a:schemeClr val="bg1">
                     <a:lumMod val="50000"/>
@@ -4029,7 +3674,7 @@
               </a:rPr>
             </a:br>
             <a:r>
-              <a:rPr lang="de-DE">
+              <a:rPr lang="de-DE" sz="1594">
                 <a:solidFill>
                   <a:schemeClr val="bg1">
                     <a:lumMod val="50000"/>
@@ -4040,7 +3685,7 @@
               <a:t>Gegenwart</a:t>
             </a:r>
             <a:br>
-              <a:rPr lang="de-DE">
+              <a:rPr lang="de-DE" sz="1594">
                 <a:solidFill>
                   <a:schemeClr val="bg1">
                     <a:lumMod val="50000"/>
@@ -4050,7 +3695,7 @@
               </a:rPr>
             </a:br>
             <a:r>
-              <a:rPr lang="de-DE">
+              <a:rPr lang="de-DE" sz="1594">
                 <a:solidFill>
                   <a:schemeClr val="bg1">
                     <a:lumMod val="50000"/>
@@ -4060,7 +3705,7 @@
               </a:rPr>
               <a:t>(informell)</a:t>
             </a:r>
-            <a:endParaRPr lang="en-US">
+            <a:endParaRPr lang="en-US" sz="1594">
               <a:solidFill>
                 <a:schemeClr val="bg1">
                   <a:lumMod val="50000"/>
@@ -4085,8 +3730,8 @@
         </p:nvSpPr>
         <p:spPr>
           <a:xfrm>
-            <a:off x="8134077" y="2789638"/>
-            <a:ext cx="1943100" cy="1866900"/>
+            <a:off x="7205225" y="4833529"/>
+            <a:ext cx="1721212" cy="1653714"/>
           </a:xfrm>
           <a:prstGeom prst="rect">
             <a:avLst/>
@@ -4124,7 +3769,7 @@
           <a:p>
             <a:pPr algn="ctr"/>
             <a:r>
-              <a:rPr lang="de-DE">
+              <a:rPr lang="de-DE" sz="1594">
                 <a:solidFill>
                   <a:schemeClr val="bg1">
                     <a:lumMod val="50000"/>
@@ -4135,7 +3780,7 @@
               <a:t>Dinge</a:t>
             </a:r>
             <a:br>
-              <a:rPr lang="de-DE">
+              <a:rPr lang="de-DE" sz="1594">
                 <a:solidFill>
                   <a:schemeClr val="bg1">
                     <a:lumMod val="50000"/>
@@ -4145,7 +3790,7 @@
               </a:rPr>
             </a:br>
             <a:r>
-              <a:rPr lang="de-DE">
+              <a:rPr lang="de-DE" sz="1594">
                 <a:solidFill>
                   <a:schemeClr val="bg1">
                     <a:lumMod val="50000"/>
@@ -4155,7 +3800,7 @@
               </a:rPr>
               <a:t>(extern)</a:t>
             </a:r>
-            <a:endParaRPr lang="en-US">
+            <a:endParaRPr lang="en-US" sz="1594">
               <a:solidFill>
                 <a:schemeClr val="bg1">
                   <a:lumMod val="50000"/>
@@ -4180,8 +3825,8 @@
         </p:nvSpPr>
         <p:spPr>
           <a:xfrm>
-            <a:off x="2426563" y="5057422"/>
-            <a:ext cx="3488815" cy="770787"/>
+            <a:off x="2149467" y="6842349"/>
+            <a:ext cx="3090418" cy="682769"/>
           </a:xfrm>
           <a:prstGeom prst="rect">
             <a:avLst/>
@@ -4219,7 +3864,7 @@
           <a:p>
             <a:pPr algn="ctr"/>
             <a:r>
-              <a:rPr lang="de-DE">
+              <a:rPr lang="de-DE" sz="1594">
                 <a:solidFill>
                   <a:schemeClr val="bg1">
                     <a:lumMod val="50000"/>
@@ -4229,7 +3874,7 @@
               </a:rPr>
               <a:t>Bewertung: +</a:t>
             </a:r>
-            <a:endParaRPr lang="en-US">
+            <a:endParaRPr lang="en-US" sz="1594">
               <a:solidFill>
                 <a:schemeClr val="bg1">
                   <a:lumMod val="50000"/>
@@ -4254,8 +3899,8 @@
         </p:nvSpPr>
         <p:spPr>
           <a:xfrm>
-            <a:off x="6389669" y="5057421"/>
-            <a:ext cx="3488815" cy="770787"/>
+            <a:off x="5660015" y="6842349"/>
+            <a:ext cx="3090418" cy="682769"/>
           </a:xfrm>
           <a:prstGeom prst="rect">
             <a:avLst/>
@@ -4293,7 +3938,7 @@
           <a:p>
             <a:pPr algn="ctr"/>
             <a:r>
-              <a:rPr lang="de-DE">
+              <a:rPr lang="de-DE" sz="1594">
                 <a:solidFill>
                   <a:schemeClr val="bg1">
                     <a:lumMod val="50000"/>
@@ -4303,7 +3948,7 @@
               </a:rPr>
               <a:t>Bewertung: - / ?</a:t>
             </a:r>
-            <a:endParaRPr lang="en-US">
+            <a:endParaRPr lang="en-US" sz="1594">
               <a:solidFill>
                 <a:schemeClr val="bg1">
                   <a:lumMod val="50000"/>
@@ -4366,8 +4011,8 @@
         </p:blipFill>
         <p:spPr>
           <a:xfrm>
-            <a:off x="489012" y="298473"/>
-            <a:ext cx="11213976" cy="6261054"/>
+            <a:off x="433170" y="2626838"/>
+            <a:ext cx="9933422" cy="5546087"/>
           </a:xfrm>
           <a:prstGeom prst="rect">
             <a:avLst/>
@@ -4426,8 +4071,8 @@
         </p:blipFill>
         <p:spPr>
           <a:xfrm>
-            <a:off x="1376418" y="207529"/>
-            <a:ext cx="9006447" cy="6442942"/>
+            <a:off x="1219242" y="2546279"/>
+            <a:ext cx="7977976" cy="5707205"/>
           </a:xfrm>
           <a:prstGeom prst="rect">
             <a:avLst/>
@@ -4486,8 +4131,8 @@
         </p:blipFill>
         <p:spPr>
           <a:xfrm>
-            <a:off x="1747817" y="389122"/>
-            <a:ext cx="8158183" cy="6079755"/>
+            <a:off x="1548229" y="2707136"/>
+            <a:ext cx="7226578" cy="5385491"/>
           </a:xfrm>
           <a:prstGeom prst="rect">
             <a:avLst/>
@@ -4508,8 +4153,8 @@
         </p:nvSpPr>
         <p:spPr>
           <a:xfrm>
-            <a:off x="1998292" y="949677"/>
-            <a:ext cx="1411658" cy="1866900"/>
+            <a:off x="1770101" y="3203678"/>
+            <a:ext cx="1250457" cy="1653714"/>
           </a:xfrm>
           <a:prstGeom prst="rect">
             <a:avLst/>
@@ -4547,7 +4192,7 @@
           <a:p>
             <a:pPr algn="ctr"/>
             <a:r>
-              <a:rPr lang="de-DE">
+              <a:rPr lang="de-DE" sz="1594">
                 <a:solidFill>
                   <a:schemeClr val="bg1">
                     <a:lumMod val="50000"/>
@@ -4558,7 +4203,7 @@
               <a:t>Regeln</a:t>
             </a:r>
             <a:br>
-              <a:rPr lang="de-DE">
+              <a:rPr lang="de-DE" sz="1594">
                 <a:solidFill>
                   <a:schemeClr val="bg1">
                     <a:lumMod val="50000"/>
@@ -4568,7 +4213,7 @@
               </a:rPr>
             </a:br>
             <a:r>
-              <a:rPr lang="de-DE">
+              <a:rPr lang="de-DE" sz="1594">
                 <a:solidFill>
                   <a:schemeClr val="bg1">
                     <a:lumMod val="50000"/>
@@ -4578,7 +4223,7 @@
               </a:rPr>
               <a:t>(formelle)</a:t>
             </a:r>
-            <a:endParaRPr lang="en-US">
+            <a:endParaRPr lang="en-US" sz="1594">
               <a:solidFill>
                 <a:schemeClr val="bg1">
                   <a:lumMod val="50000"/>
@@ -4603,8 +4248,8 @@
         </p:nvSpPr>
         <p:spPr>
           <a:xfrm>
-            <a:off x="6684315" y="949677"/>
-            <a:ext cx="1411659" cy="1764948"/>
+            <a:off x="5921015" y="3203679"/>
+            <a:ext cx="1250458" cy="1563404"/>
           </a:xfrm>
           <a:prstGeom prst="rect">
             <a:avLst/>
@@ -4642,7 +4287,7 @@
           <a:p>
             <a:pPr algn="ctr"/>
             <a:r>
-              <a:rPr lang="de-DE">
+              <a:rPr lang="de-DE" sz="1594">
                 <a:solidFill>
                   <a:schemeClr val="bg1">
                     <a:lumMod val="50000"/>
@@ -4653,7 +4298,7 @@
               <a:t>Menschen + Ideen</a:t>
             </a:r>
             <a:br>
-              <a:rPr lang="de-DE">
+              <a:rPr lang="de-DE" sz="1594">
                 <a:solidFill>
                   <a:schemeClr val="bg1">
                     <a:lumMod val="50000"/>
@@ -4663,7 +4308,7 @@
               </a:rPr>
             </a:br>
             <a:r>
-              <a:rPr lang="de-DE">
+              <a:rPr lang="de-DE" sz="1594">
                 <a:solidFill>
                   <a:schemeClr val="bg1">
                     <a:lumMod val="50000"/>
@@ -4673,7 +4318,7 @@
               </a:rPr>
               <a:t>(semi-formal)</a:t>
             </a:r>
-            <a:endParaRPr lang="en-US">
+            <a:endParaRPr lang="en-US" sz="1594">
               <a:solidFill>
                 <a:schemeClr val="bg1">
                   <a:lumMod val="50000"/>
@@ -4698,8 +4343,8 @@
         </p:nvSpPr>
         <p:spPr>
           <a:xfrm>
-            <a:off x="5146359" y="949678"/>
-            <a:ext cx="1361097" cy="1764948"/>
+            <a:off x="4558682" y="3203679"/>
+            <a:ext cx="1205670" cy="1563404"/>
           </a:xfrm>
           <a:prstGeom prst="rect">
             <a:avLst/>
@@ -4737,7 +4382,7 @@
           <a:p>
             <a:pPr algn="ctr"/>
             <a:r>
-              <a:rPr lang="de-DE">
+              <a:rPr lang="de-DE" sz="1594">
                 <a:solidFill>
                   <a:schemeClr val="bg1">
                     <a:lumMod val="50000"/>
@@ -4748,7 +4393,7 @@
               <a:t>Ideen </a:t>
             </a:r>
             <a:br>
-              <a:rPr lang="de-DE">
+              <a:rPr lang="de-DE" sz="1594">
                 <a:solidFill>
                   <a:schemeClr val="bg1">
                     <a:lumMod val="50000"/>
@@ -4758,7 +4403,7 @@
               </a:rPr>
             </a:br>
             <a:r>
-              <a:rPr lang="de-DE">
+              <a:rPr lang="de-DE" sz="1594">
                 <a:solidFill>
                   <a:schemeClr val="bg1">
                     <a:lumMod val="50000"/>
@@ -4769,7 +4414,7 @@
               <a:t>(Zukunft)</a:t>
             </a:r>
             <a:br>
-              <a:rPr lang="de-DE">
+              <a:rPr lang="de-DE" sz="1594">
                 <a:solidFill>
                   <a:schemeClr val="bg1">
                     <a:lumMod val="50000"/>
@@ -4779,7 +4424,7 @@
               </a:rPr>
             </a:br>
             <a:r>
-              <a:rPr lang="de-DE">
+              <a:rPr lang="de-DE" sz="1594">
                 <a:solidFill>
                   <a:schemeClr val="bg1">
                     <a:lumMod val="50000"/>
@@ -4789,7 +4434,7 @@
               </a:rPr>
               <a:t>(formal)</a:t>
             </a:r>
-            <a:endParaRPr lang="en-US">
+            <a:endParaRPr lang="en-US" sz="1594">
               <a:solidFill>
                 <a:schemeClr val="bg1">
                   <a:lumMod val="50000"/>
@@ -4814,8 +4459,8 @@
         </p:nvSpPr>
         <p:spPr>
           <a:xfrm>
-            <a:off x="8229599" y="949677"/>
-            <a:ext cx="1542777" cy="1866900"/>
+            <a:off x="7289839" y="3203678"/>
+            <a:ext cx="1366603" cy="1653714"/>
           </a:xfrm>
           <a:prstGeom prst="rect">
             <a:avLst/>
@@ -4853,7 +4498,7 @@
           <a:p>
             <a:pPr algn="ctr"/>
             <a:r>
-              <a:rPr lang="de-DE">
+              <a:rPr lang="de-DE" sz="1594">
                 <a:solidFill>
                   <a:schemeClr val="bg1">
                     <a:lumMod val="50000"/>
@@ -4864,7 +4509,7 @@
               <a:t>Menschen</a:t>
             </a:r>
             <a:br>
-              <a:rPr lang="de-DE">
+              <a:rPr lang="de-DE" sz="1594">
                 <a:solidFill>
                   <a:schemeClr val="bg1">
                     <a:lumMod val="50000"/>
@@ -4874,7 +4519,7 @@
               </a:rPr>
             </a:br>
             <a:r>
-              <a:rPr lang="de-DE">
+              <a:rPr lang="de-DE" sz="1594">
                 <a:solidFill>
                   <a:schemeClr val="bg1">
                     <a:lumMod val="50000"/>
@@ -4884,7 +4529,7 @@
               </a:rPr>
               <a:t>(extern)</a:t>
             </a:r>
-            <a:endParaRPr lang="en-US">
+            <a:endParaRPr lang="en-US" sz="1594">
               <a:solidFill>
                 <a:schemeClr val="bg1">
                   <a:lumMod val="50000"/>
@@ -4909,8 +4554,8 @@
         </p:nvSpPr>
         <p:spPr>
           <a:xfrm>
-            <a:off x="5610578" y="2816576"/>
-            <a:ext cx="2480613" cy="1764947"/>
+            <a:off x="4969891" y="4857392"/>
+            <a:ext cx="2197345" cy="1563403"/>
           </a:xfrm>
           <a:prstGeom prst="rect">
             <a:avLst/>
@@ -4948,7 +4593,7 @@
           <a:p>
             <a:pPr algn="ctr"/>
             <a:r>
-              <a:rPr lang="de-DE">
+              <a:rPr lang="de-DE" sz="1594">
                 <a:solidFill>
                   <a:schemeClr val="bg1">
                     <a:lumMod val="50000"/>
@@ -4958,7 +4603,7 @@
               </a:rPr>
               <a:t>Dinge, Werkzeuge</a:t>
             </a:r>
-            <a:endParaRPr lang="en-US">
+            <a:endParaRPr lang="en-US" sz="1594">
               <a:solidFill>
                 <a:schemeClr val="bg1">
                   <a:lumMod val="50000"/>
@@ -4983,8 +4628,8 @@
         </p:nvSpPr>
         <p:spPr>
           <a:xfrm>
-            <a:off x="1212479" y="5048193"/>
-            <a:ext cx="1571626" cy="1067129"/>
+            <a:off x="1074022" y="6834174"/>
+            <a:ext cx="1392158" cy="945271"/>
           </a:xfrm>
           <a:prstGeom prst="rect">
             <a:avLst/>
@@ -5022,7 +4667,7 @@
           <a:p>
             <a:pPr algn="ctr"/>
             <a:r>
-              <a:rPr lang="de-DE">
+              <a:rPr lang="de-DE" sz="1594">
                 <a:solidFill>
                   <a:schemeClr val="bg1">
                     <a:lumMod val="50000"/>
@@ -5033,7 +4678,7 @@
               <a:t>Menschen</a:t>
             </a:r>
             <a:br>
-              <a:rPr lang="de-DE">
+              <a:rPr lang="de-DE" sz="1594">
                 <a:solidFill>
                   <a:schemeClr val="bg1">
                     <a:lumMod val="50000"/>
@@ -5043,7 +4688,7 @@
               </a:rPr>
             </a:br>
             <a:r>
-              <a:rPr lang="de-DE">
+              <a:rPr lang="de-DE" sz="1594">
                 <a:solidFill>
                   <a:schemeClr val="bg1">
                     <a:lumMod val="50000"/>
@@ -5054,7 +4699,7 @@
               <a:t>(Zukunft)</a:t>
             </a:r>
             <a:br>
-              <a:rPr lang="de-DE">
+              <a:rPr lang="de-DE" sz="1594">
                 <a:solidFill>
                   <a:schemeClr val="bg1">
                     <a:lumMod val="50000"/>
@@ -5064,7 +4709,7 @@
               </a:rPr>
             </a:br>
             <a:r>
-              <a:rPr lang="de-DE">
+              <a:rPr lang="de-DE" sz="1594">
                 <a:solidFill>
                   <a:schemeClr val="bg1">
                     <a:lumMod val="50000"/>
@@ -5074,7 +4719,7 @@
               </a:rPr>
               <a:t>(semi-formal)</a:t>
             </a:r>
-            <a:endParaRPr lang="en-US">
+            <a:endParaRPr lang="en-US" sz="1594">
               <a:solidFill>
                 <a:schemeClr val="bg1">
                   <a:lumMod val="50000"/>
@@ -5099,8 +4744,8 @@
         </p:nvSpPr>
         <p:spPr>
           <a:xfrm>
-            <a:off x="-195283" y="2816577"/>
-            <a:ext cx="1943100" cy="1866900"/>
+            <a:off x="-172983" y="4857392"/>
+            <a:ext cx="1721212" cy="1653714"/>
           </a:xfrm>
           <a:prstGeom prst="rect">
             <a:avLst/>
@@ -5138,7 +4783,7 @@
           <a:p>
             <a:pPr algn="ctr"/>
             <a:r>
-              <a:rPr lang="de-DE">
+              <a:rPr lang="de-DE" sz="1594">
                 <a:solidFill>
                   <a:schemeClr val="bg1">
                     <a:lumMod val="50000"/>
@@ -5149,7 +4794,7 @@
               <a:t>Ideen / Werte</a:t>
             </a:r>
             <a:br>
-              <a:rPr lang="de-DE">
+              <a:rPr lang="de-DE" sz="1594">
                 <a:solidFill>
                   <a:schemeClr val="bg1">
                     <a:lumMod val="50000"/>
@@ -5159,7 +4804,7 @@
               </a:rPr>
             </a:br>
             <a:r>
-              <a:rPr lang="de-DE">
+              <a:rPr lang="de-DE" sz="1594">
                 <a:solidFill>
                   <a:schemeClr val="bg1">
                     <a:lumMod val="50000"/>
@@ -5170,7 +4815,7 @@
               <a:t>Gegenwart</a:t>
             </a:r>
             <a:br>
-              <a:rPr lang="de-DE">
+              <a:rPr lang="de-DE" sz="1594">
                 <a:solidFill>
                   <a:schemeClr val="bg1">
                     <a:lumMod val="50000"/>
@@ -5180,7 +4825,7 @@
               </a:rPr>
             </a:br>
             <a:r>
-              <a:rPr lang="de-DE">
+              <a:rPr lang="de-DE" sz="1594">
                 <a:solidFill>
                   <a:schemeClr val="bg1">
                     <a:lumMod val="50000"/>
@@ -5190,7 +4835,7 @@
               </a:rPr>
               <a:t>(informell)</a:t>
             </a:r>
-            <a:endParaRPr lang="en-US">
+            <a:endParaRPr lang="en-US" sz="1594">
               <a:solidFill>
                 <a:schemeClr val="bg1">
                   <a:lumMod val="50000"/>
@@ -5215,8 +4860,8 @@
         </p:nvSpPr>
         <p:spPr>
           <a:xfrm>
-            <a:off x="9906000" y="3037288"/>
-            <a:ext cx="1943100" cy="1866900"/>
+            <a:off x="8774807" y="5052899"/>
+            <a:ext cx="1721212" cy="1653714"/>
           </a:xfrm>
           <a:prstGeom prst="rect">
             <a:avLst/>
@@ -5254,7 +4899,7 @@
           <a:p>
             <a:pPr algn="ctr"/>
             <a:r>
-              <a:rPr lang="de-DE">
+              <a:rPr lang="de-DE" sz="1594">
                 <a:solidFill>
                   <a:schemeClr val="bg1">
                     <a:lumMod val="50000"/>
@@ -5265,7 +4910,7 @@
               <a:t>Dinge</a:t>
             </a:r>
             <a:br>
-              <a:rPr lang="de-DE">
+              <a:rPr lang="de-DE" sz="1594">
                 <a:solidFill>
                   <a:schemeClr val="bg1">
                     <a:lumMod val="50000"/>
@@ -5275,7 +4920,7 @@
               </a:rPr>
             </a:br>
             <a:r>
-              <a:rPr lang="de-DE">
+              <a:rPr lang="de-DE" sz="1594">
                 <a:solidFill>
                   <a:schemeClr val="bg1">
                     <a:lumMod val="50000"/>
@@ -5285,7 +4930,7 @@
               </a:rPr>
               <a:t>(extern)</a:t>
             </a:r>
-            <a:endParaRPr lang="en-US">
+            <a:endParaRPr lang="en-US" sz="1594">
               <a:solidFill>
                 <a:schemeClr val="bg1">
                   <a:lumMod val="50000"/>
@@ -5310,8 +4955,8 @@
         </p:nvSpPr>
         <p:spPr>
           <a:xfrm>
-            <a:off x="2121763" y="5095522"/>
-            <a:ext cx="3488815" cy="770787"/>
+            <a:off x="1879473" y="6876099"/>
+            <a:ext cx="3090418" cy="682769"/>
           </a:xfrm>
           <a:prstGeom prst="rect">
             <a:avLst/>
@@ -5349,7 +4994,7 @@
           <a:p>
             <a:pPr algn="ctr"/>
             <a:r>
-              <a:rPr lang="de-DE">
+              <a:rPr lang="de-DE" sz="1594">
                 <a:solidFill>
                   <a:schemeClr val="bg1">
                     <a:lumMod val="50000"/>
@@ -5359,7 +5004,7 @@
               </a:rPr>
               <a:t>Bewertung: +</a:t>
             </a:r>
-            <a:endParaRPr lang="en-US">
+            <a:endParaRPr lang="en-US" sz="1594">
               <a:solidFill>
                 <a:schemeClr val="bg1">
                   <a:lumMod val="50000"/>
@@ -5384,8 +5029,8 @@
         </p:nvSpPr>
         <p:spPr>
           <a:xfrm>
-            <a:off x="6084869" y="5095521"/>
-            <a:ext cx="3488815" cy="770787"/>
+            <a:off x="5390021" y="6876098"/>
+            <a:ext cx="3090418" cy="682769"/>
           </a:xfrm>
           <a:prstGeom prst="rect">
             <a:avLst/>
@@ -5423,7 +5068,7 @@
           <a:p>
             <a:pPr algn="ctr"/>
             <a:r>
-              <a:rPr lang="de-DE">
+              <a:rPr lang="de-DE" sz="1594">
                 <a:solidFill>
                   <a:schemeClr val="bg1">
                     <a:lumMod val="50000"/>
@@ -5433,7 +5078,7 @@
               </a:rPr>
               <a:t>Bewertung: - / ?</a:t>
             </a:r>
-            <a:endParaRPr lang="en-US">
+            <a:endParaRPr lang="en-US" sz="1594">
               <a:solidFill>
                 <a:schemeClr val="bg1">
                   <a:lumMod val="50000"/>
@@ -5496,8 +5141,8 @@
         </p:blipFill>
         <p:spPr>
           <a:xfrm>
-            <a:off x="1771635" y="638776"/>
-            <a:ext cx="8334390" cy="5789997"/>
+            <a:off x="1569327" y="2928280"/>
+            <a:ext cx="7382663" cy="5128822"/>
           </a:xfrm>
           <a:prstGeom prst="rect">
             <a:avLst/>
@@ -5556,8 +5201,8 @@
         </p:blipFill>
         <p:spPr>
           <a:xfrm>
-            <a:off x="1976420" y="323400"/>
-            <a:ext cx="8386780" cy="6211200"/>
+            <a:off x="1750727" y="2648918"/>
+            <a:ext cx="7429071" cy="5501926"/>
           </a:xfrm>
           <a:prstGeom prst="rect">
             <a:avLst/>
@@ -5616,8 +5261,8 @@
         </p:blipFill>
         <p:spPr>
           <a:xfrm>
-            <a:off x="1590675" y="295275"/>
-            <a:ext cx="9144000" cy="6461918"/>
+            <a:off x="1409031" y="2624005"/>
+            <a:ext cx="8099822" cy="5724014"/>
           </a:xfrm>
           <a:prstGeom prst="rect">
             <a:avLst/>
@@ -5681,8 +5326,8 @@
         </p:blipFill>
         <p:spPr>
           <a:xfrm>
-            <a:off x="1741487" y="600074"/>
-            <a:ext cx="8869363" cy="5811091"/>
+            <a:off x="1542622" y="2893998"/>
+            <a:ext cx="7856546" cy="5147507"/>
           </a:xfrm>
           <a:prstGeom prst="rect">
             <a:avLst/>
@@ -5719,6 +5364,352 @@
           <a:chExt cx="0" cy="0"/>
         </a:xfrm>
       </p:grpSpPr>
+      <p:pic>
+        <p:nvPicPr>
+          <p:cNvPr id="5" name="Picture 4">
+            <a:extLst>
+              <a:ext uri="{FF2B5EF4-FFF2-40B4-BE49-F238E27FC236}">
+                <a16:creationId xmlns:a16="http://schemas.microsoft.com/office/drawing/2014/main" id="{519E8518-0D47-4FBE-B3E7-03FFB1949021}"/>
+              </a:ext>
+            </a:extLst>
+          </p:cNvPr>
+          <p:cNvPicPr>
+            <a:picLocks noChangeAspect="1"/>
+          </p:cNvPicPr>
+          <p:nvPr/>
+        </p:nvPicPr>
+        <p:blipFill>
+          <a:blip r:embed="rId2"/>
+          <a:stretch>
+            <a:fillRect/>
+          </a:stretch>
+        </p:blipFill>
+        <p:spPr>
+          <a:xfrm flipV="1">
+            <a:off x="2807346" y="5121863"/>
+            <a:ext cx="5251754" cy="2773653"/>
+          </a:xfrm>
+          <a:prstGeom prst="rect">
+            <a:avLst/>
+          </a:prstGeom>
+          <a:ln>
+            <a:noFill/>
+          </a:ln>
+          <a:effectLst/>
+          <a:scene3d>
+            <a:camera prst="perspectiveRelaxedModerately" fov="4500000">
+              <a:rot lat="7800000" lon="0" rev="0"/>
+            </a:camera>
+            <a:lightRig rig="threePt" dir="t">
+              <a:rot lat="0" lon="0" rev="0"/>
+            </a:lightRig>
+          </a:scene3d>
+          <a:sp3d z="590550" prstMaterial="powder"/>
+        </p:spPr>
+      </p:pic>
+      <p:pic>
+        <p:nvPicPr>
+          <p:cNvPr id="7" name="Picture 6">
+            <a:extLst>
+              <a:ext uri="{FF2B5EF4-FFF2-40B4-BE49-F238E27FC236}">
+                <a16:creationId xmlns:a16="http://schemas.microsoft.com/office/drawing/2014/main" id="{03505E4C-1682-49FC-80BB-41950E219070}"/>
+              </a:ext>
+            </a:extLst>
+          </p:cNvPr>
+          <p:cNvPicPr>
+            <a:picLocks noChangeAspect="1"/>
+          </p:cNvPicPr>
+          <p:nvPr/>
+        </p:nvPicPr>
+        <p:blipFill>
+          <a:blip r:embed="rId3"/>
+          <a:stretch>
+            <a:fillRect/>
+          </a:stretch>
+        </p:blipFill>
+        <p:spPr>
+          <a:xfrm flipV="1">
+            <a:off x="3138482" y="3509174"/>
+            <a:ext cx="4589481" cy="2422773"/>
+          </a:xfrm>
+          <a:prstGeom prst="rect">
+            <a:avLst/>
+          </a:prstGeom>
+          <a:ln>
+            <a:noFill/>
+          </a:ln>
+          <a:effectLst/>
+          <a:scene3d>
+            <a:camera prst="perspectiveRelaxedModerately" fov="4500000">
+              <a:rot lat="7800000" lon="0" rev="0"/>
+            </a:camera>
+            <a:lightRig rig="threePt" dir="t">
+              <a:rot lat="0" lon="0" rev="0"/>
+            </a:lightRig>
+          </a:scene3d>
+          <a:sp3d z="590550" prstMaterial="powder"/>
+        </p:spPr>
+      </p:pic>
+      <p:pic>
+        <p:nvPicPr>
+          <p:cNvPr id="9" name="Picture 8">
+            <a:extLst>
+              <a:ext uri="{FF2B5EF4-FFF2-40B4-BE49-F238E27FC236}">
+                <a16:creationId xmlns:a16="http://schemas.microsoft.com/office/drawing/2014/main" id="{7F64D1B9-0A6E-4065-8FA5-EBF6A360F0CC}"/>
+              </a:ext>
+            </a:extLst>
+          </p:cNvPr>
+          <p:cNvPicPr>
+            <a:picLocks noChangeAspect="1"/>
+          </p:cNvPicPr>
+          <p:nvPr/>
+        </p:nvPicPr>
+        <p:blipFill>
+          <a:blip r:embed="rId4"/>
+          <a:stretch>
+            <a:fillRect/>
+          </a:stretch>
+        </p:blipFill>
+        <p:spPr>
+          <a:xfrm flipV="1">
+            <a:off x="3180246" y="1858830"/>
+            <a:ext cx="4505954" cy="2343477"/>
+          </a:xfrm>
+          <a:prstGeom prst="rect">
+            <a:avLst/>
+          </a:prstGeom>
+          <a:ln>
+            <a:noFill/>
+          </a:ln>
+          <a:effectLst/>
+          <a:scene3d>
+            <a:camera prst="perspectiveRelaxedModerately" fov="4500000">
+              <a:rot lat="7800000" lon="0" rev="0"/>
+            </a:camera>
+            <a:lightRig rig="threePt" dir="t">
+              <a:rot lat="0" lon="0" rev="0"/>
+            </a:lightRig>
+          </a:scene3d>
+          <a:sp3d z="590550" prstMaterial="powder"/>
+        </p:spPr>
+      </p:pic>
+      <p:pic>
+        <p:nvPicPr>
+          <p:cNvPr id="11" name="Picture 10">
+            <a:extLst>
+              <a:ext uri="{FF2B5EF4-FFF2-40B4-BE49-F238E27FC236}">
+                <a16:creationId xmlns:a16="http://schemas.microsoft.com/office/drawing/2014/main" id="{DAFFA45C-2F0C-4DB0-8CD1-2A6E82A08F5A}"/>
+              </a:ext>
+            </a:extLst>
+          </p:cNvPr>
+          <p:cNvPicPr>
+            <a:picLocks noChangeAspect="1"/>
+          </p:cNvPicPr>
+          <p:nvPr/>
+        </p:nvPicPr>
+        <p:blipFill>
+          <a:blip r:embed="rId5"/>
+          <a:stretch>
+            <a:fillRect/>
+          </a:stretch>
+        </p:blipFill>
+        <p:spPr>
+          <a:xfrm rot="16200000">
+            <a:off x="-2123933" y="5876517"/>
+            <a:ext cx="6633057" cy="739010"/>
+          </a:xfrm>
+          <a:prstGeom prst="rect">
+            <a:avLst/>
+          </a:prstGeom>
+        </p:spPr>
+      </p:pic>
+      <p:sp>
+        <p:nvSpPr>
+          <p:cNvPr id="12" name="TextBox 11">
+            <a:extLst>
+              <a:ext uri="{FF2B5EF4-FFF2-40B4-BE49-F238E27FC236}">
+                <a16:creationId xmlns:a16="http://schemas.microsoft.com/office/drawing/2014/main" id="{079EEDFB-A1CE-437E-B3C5-FB73771DA0C0}"/>
+              </a:ext>
+            </a:extLst>
+          </p:cNvPr>
+          <p:cNvSpPr txBox="1"/>
+          <p:nvPr/>
+        </p:nvSpPr>
+        <p:spPr>
+          <a:xfrm>
+            <a:off x="9105900" y="8820150"/>
+            <a:ext cx="1124026" cy="369332"/>
+          </a:xfrm>
+          <a:prstGeom prst="rect">
+            <a:avLst/>
+          </a:prstGeom>
+          <a:noFill/>
+        </p:spPr>
+        <p:txBody>
+          <a:bodyPr wrap="none" rtlCol="0">
+            <a:spAutoFit/>
+          </a:bodyPr>
+          <a:lstStyle/>
+          <a:p>
+            <a:r>
+              <a:rPr lang="de-DE"/>
+              <a:t>Individum</a:t>
+            </a:r>
+            <a:endParaRPr lang="en-US"/>
+          </a:p>
+        </p:txBody>
+      </p:sp>
+      <p:sp>
+        <p:nvSpPr>
+          <p:cNvPr id="13" name="TextBox 12">
+            <a:extLst>
+              <a:ext uri="{FF2B5EF4-FFF2-40B4-BE49-F238E27FC236}">
+                <a16:creationId xmlns:a16="http://schemas.microsoft.com/office/drawing/2014/main" id="{B2ABD39B-B855-455B-B0D0-6BE889DC9B2E}"/>
+              </a:ext>
+            </a:extLst>
+          </p:cNvPr>
+          <p:cNvSpPr txBox="1"/>
+          <p:nvPr/>
+        </p:nvSpPr>
+        <p:spPr>
+          <a:xfrm>
+            <a:off x="9029700" y="6581775"/>
+            <a:ext cx="686726" cy="369332"/>
+          </a:xfrm>
+          <a:prstGeom prst="rect">
+            <a:avLst/>
+          </a:prstGeom>
+          <a:noFill/>
+        </p:spPr>
+        <p:txBody>
+          <a:bodyPr wrap="none" rtlCol="0">
+            <a:spAutoFit/>
+          </a:bodyPr>
+          <a:lstStyle/>
+          <a:p>
+            <a:r>
+              <a:rPr lang="de-DE"/>
+              <a:t>Team</a:t>
+            </a:r>
+            <a:endParaRPr lang="en-US"/>
+          </a:p>
+        </p:txBody>
+      </p:sp>
+      <p:sp>
+        <p:nvSpPr>
+          <p:cNvPr id="14" name="TextBox 13">
+            <a:extLst>
+              <a:ext uri="{FF2B5EF4-FFF2-40B4-BE49-F238E27FC236}">
+                <a16:creationId xmlns:a16="http://schemas.microsoft.com/office/drawing/2014/main" id="{DD7AAA19-9721-4D3B-B7C9-A269B1F5495F}"/>
+              </a:ext>
+            </a:extLst>
+          </p:cNvPr>
+          <p:cNvSpPr txBox="1"/>
+          <p:nvPr/>
+        </p:nvSpPr>
+        <p:spPr>
+          <a:xfrm>
+            <a:off x="9029700" y="4784797"/>
+            <a:ext cx="1076577" cy="369332"/>
+          </a:xfrm>
+          <a:prstGeom prst="rect">
+            <a:avLst/>
+          </a:prstGeom>
+          <a:noFill/>
+        </p:spPr>
+        <p:txBody>
+          <a:bodyPr wrap="none" rtlCol="0">
+            <a:spAutoFit/>
+          </a:bodyPr>
+          <a:lstStyle/>
+          <a:p>
+            <a:r>
+              <a:rPr lang="de-DE"/>
+              <a:t>Netzwerk</a:t>
+            </a:r>
+            <a:endParaRPr lang="en-US"/>
+          </a:p>
+        </p:txBody>
+      </p:sp>
+      <p:sp>
+        <p:nvSpPr>
+          <p:cNvPr id="15" name="TextBox 14">
+            <a:extLst>
+              <a:ext uri="{FF2B5EF4-FFF2-40B4-BE49-F238E27FC236}">
+                <a16:creationId xmlns:a16="http://schemas.microsoft.com/office/drawing/2014/main" id="{C679D5A8-FAA5-4835-B630-9D047DBD453E}"/>
+              </a:ext>
+            </a:extLst>
+          </p:cNvPr>
+          <p:cNvSpPr txBox="1"/>
+          <p:nvPr/>
+        </p:nvSpPr>
+        <p:spPr>
+          <a:xfrm>
+            <a:off x="9029699" y="3236985"/>
+            <a:ext cx="1375761" cy="369332"/>
+          </a:xfrm>
+          <a:prstGeom prst="rect">
+            <a:avLst/>
+          </a:prstGeom>
+          <a:noFill/>
+        </p:spPr>
+        <p:txBody>
+          <a:bodyPr wrap="none" rtlCol="0">
+            <a:spAutoFit/>
+          </a:bodyPr>
+          <a:lstStyle/>
+          <a:p>
+            <a:r>
+              <a:rPr lang="de-DE"/>
+              <a:t>Organisation</a:t>
+            </a:r>
+            <a:endParaRPr lang="en-US"/>
+          </a:p>
+        </p:txBody>
+      </p:sp>
+      <p:pic>
+        <p:nvPicPr>
+          <p:cNvPr id="17" name="Picture 16">
+            <a:extLst>
+              <a:ext uri="{FF2B5EF4-FFF2-40B4-BE49-F238E27FC236}">
+                <a16:creationId xmlns:a16="http://schemas.microsoft.com/office/drawing/2014/main" id="{FEDFADE8-4B99-437D-80F7-43CFABDEFE87}"/>
+              </a:ext>
+            </a:extLst>
+          </p:cNvPr>
+          <p:cNvPicPr>
+            <a:picLocks noChangeAspect="1"/>
+          </p:cNvPicPr>
+          <p:nvPr/>
+        </p:nvPicPr>
+        <p:blipFill>
+          <a:blip r:embed="rId6"/>
+          <a:stretch>
+            <a:fillRect/>
+          </a:stretch>
+        </p:blipFill>
+        <p:spPr>
+          <a:xfrm flipV="1">
+            <a:off x="2446851" y="7076467"/>
+            <a:ext cx="5972744" cy="3017054"/>
+          </a:xfrm>
+          <a:prstGeom prst="rect">
+            <a:avLst/>
+          </a:prstGeom>
+          <a:ln>
+            <a:noFill/>
+          </a:ln>
+          <a:effectLst/>
+          <a:scene3d>
+            <a:camera prst="perspectiveRelaxedModerately" fov="4500000">
+              <a:rot lat="7800000" lon="0" rev="0"/>
+            </a:camera>
+            <a:lightRig rig="threePt" dir="t">
+              <a:rot lat="0" lon="0" rev="0"/>
+            </a:lightRig>
+          </a:scene3d>
+          <a:sp3d z="590550" prstMaterial="powder"/>
+        </p:spPr>
+      </p:pic>
     </p:spTree>
     <p:extLst>
       <p:ext uri="{BB962C8B-B14F-4D97-AF65-F5344CB8AC3E}">
@@ -5735,7 +5726,7 @@
 <file path=ppt/theme/theme1.xml><?xml version="1.0" encoding="utf-8"?>
 <a:theme xmlns:a="http://schemas.openxmlformats.org/drawingml/2006/main" name="Office Theme">
   <a:themeElements>
-    <a:clrScheme name="Office">
+    <a:clrScheme name="Office Theme">
       <a:dk1>
         <a:sysClr val="windowText" lastClr="000000"/>
       </a:dk1>
@@ -5773,7 +5764,7 @@
         <a:srgbClr val="954F72"/>
       </a:folHlink>
     </a:clrScheme>
-    <a:fontScheme name="Office">
+    <a:fontScheme name="Office Theme">
       <a:majorFont>
         <a:latin typeface="Calibri Light" panose="020F0302020204030204"/>
         <a:ea typeface=""/>
@@ -5808,23 +5799,6 @@
         <a:font script="Viet" typeface="Times New Roman"/>
         <a:font script="Uigh" typeface="Microsoft Uighur"/>
         <a:font script="Geor" typeface="Sylfaen"/>
-        <a:font script="Armn" typeface="Arial"/>
-        <a:font script="Bugi" typeface="Leelawadee UI"/>
-        <a:font script="Bopo" typeface="Microsoft JhengHei"/>
-        <a:font script="Java" typeface="Javanese Text"/>
-        <a:font script="Lisu" typeface="Segoe UI"/>
-        <a:font script="Mymr" typeface="Myanmar Text"/>
-        <a:font script="Nkoo" typeface="Ebrima"/>
-        <a:font script="Olck" typeface="Nirmala UI"/>
-        <a:font script="Osma" typeface="Ebrima"/>
-        <a:font script="Phag" typeface="Phagspa"/>
-        <a:font script="Syrn" typeface="Estrangelo Edessa"/>
-        <a:font script="Syrj" typeface="Estrangelo Edessa"/>
-        <a:font script="Syre" typeface="Estrangelo Edessa"/>
-        <a:font script="Sora" typeface="Nirmala UI"/>
-        <a:font script="Tale" typeface="Microsoft Tai Le"/>
-        <a:font script="Talu" typeface="Microsoft New Tai Lue"/>
-        <a:font script="Tfng" typeface="Ebrima"/>
       </a:majorFont>
       <a:minorFont>
         <a:latin typeface="Calibri" panose="020F0502020204030204"/>
@@ -5860,26 +5834,9 @@
         <a:font script="Viet" typeface="Arial"/>
         <a:font script="Uigh" typeface="Microsoft Uighur"/>
         <a:font script="Geor" typeface="Sylfaen"/>
-        <a:font script="Armn" typeface="Arial"/>
-        <a:font script="Bugi" typeface="Leelawadee UI"/>
-        <a:font script="Bopo" typeface="Microsoft JhengHei"/>
-        <a:font script="Java" typeface="Javanese Text"/>
-        <a:font script="Lisu" typeface="Segoe UI"/>
-        <a:font script="Mymr" typeface="Myanmar Text"/>
-        <a:font script="Nkoo" typeface="Ebrima"/>
-        <a:font script="Olck" typeface="Nirmala UI"/>
-        <a:font script="Osma" typeface="Ebrima"/>
-        <a:font script="Phag" typeface="Phagspa"/>
-        <a:font script="Syrn" typeface="Estrangelo Edessa"/>
-        <a:font script="Syrj" typeface="Estrangelo Edessa"/>
-        <a:font script="Syre" typeface="Estrangelo Edessa"/>
-        <a:font script="Sora" typeface="Nirmala UI"/>
-        <a:font script="Tale" typeface="Microsoft Tai Le"/>
-        <a:font script="Talu" typeface="Microsoft New Tai Lue"/>
-        <a:font script="Tfng" typeface="Ebrima"/>
       </a:minorFont>
     </a:fontScheme>
-    <a:fmtScheme name="Office">
+    <a:fmtScheme name="Office Theme">
       <a:fillStyleLst>
         <a:solidFill>
           <a:schemeClr val="phClr"/>

</xml_diff>